<commit_message>
Update Digital Asset - Design.pptx
</commit_message>
<xml_diff>
--- a/Design/Digital Asset - Design.pptx
+++ b/Design/Digital Asset - Design.pptx
@@ -8,10 +8,12 @@
     <p:sldId id="8322" r:id="rId5"/>
     <p:sldId id="8341" r:id="rId6"/>
     <p:sldId id="8335" r:id="rId7"/>
-    <p:sldId id="8336" r:id="rId8"/>
-    <p:sldId id="8338" r:id="rId9"/>
-    <p:sldId id="8344" r:id="rId10"/>
-    <p:sldId id="8345" r:id="rId11"/>
+    <p:sldId id="8346" r:id="rId8"/>
+    <p:sldId id="8347" r:id="rId9"/>
+    <p:sldId id="8336" r:id="rId10"/>
+    <p:sldId id="8338" r:id="rId11"/>
+    <p:sldId id="8344" r:id="rId12"/>
+    <p:sldId id="8345" r:id="rId13"/>
   </p:sldIdLst>
   <p:sldSz cx="12192000" cy="6858000"/>
   <p:notesSz cx="6858000" cy="9144000"/>
@@ -265,7 +267,7 @@
           <a:p>
             <a:fld id="{8FBEF592-9A5F-4028-BE74-EE215189E296}" type="datetimeFigureOut">
               <a:rPr lang="en-US" smtClean="0"/>
-              <a:t>6/22/2021</a:t>
+              <a:t>6/27/2021</a:t>
             </a:fld>
             <a:endParaRPr lang="en-US"/>
           </a:p>
@@ -463,7 +465,7 @@
           <a:p>
             <a:fld id="{8FBEF592-9A5F-4028-BE74-EE215189E296}" type="datetimeFigureOut">
               <a:rPr lang="en-US" smtClean="0"/>
-              <a:t>6/22/2021</a:t>
+              <a:t>6/27/2021</a:t>
             </a:fld>
             <a:endParaRPr lang="en-US"/>
           </a:p>
@@ -671,7 +673,7 @@
           <a:p>
             <a:fld id="{8FBEF592-9A5F-4028-BE74-EE215189E296}" type="datetimeFigureOut">
               <a:rPr lang="en-US" smtClean="0"/>
-              <a:t>6/22/2021</a:t>
+              <a:t>6/27/2021</a:t>
             </a:fld>
             <a:endParaRPr lang="en-US"/>
           </a:p>
@@ -784,7 +786,7 @@
           <a:p>
             <a:fld id="{708BE3AE-D757-42E3-9D32-22A977FECB4E}" type="datetime4">
               <a:rPr lang="en-US" smtClean="0"/>
-              <a:t>June 22, 2021</a:t>
+              <a:t>June 27, 2021</a:t>
             </a:fld>
             <a:endParaRPr lang="en-US" dirty="0"/>
           </a:p>
@@ -986,7 +988,7 @@
           <a:p>
             <a:fld id="{8FBEF592-9A5F-4028-BE74-EE215189E296}" type="datetimeFigureOut">
               <a:rPr lang="en-US" smtClean="0"/>
-              <a:t>6/22/2021</a:t>
+              <a:t>6/27/2021</a:t>
             </a:fld>
             <a:endParaRPr lang="en-US"/>
           </a:p>
@@ -1261,7 +1263,7 @@
           <a:p>
             <a:fld id="{8FBEF592-9A5F-4028-BE74-EE215189E296}" type="datetimeFigureOut">
               <a:rPr lang="en-US" smtClean="0"/>
-              <a:t>6/22/2021</a:t>
+              <a:t>6/27/2021</a:t>
             </a:fld>
             <a:endParaRPr lang="en-US"/>
           </a:p>
@@ -1526,7 +1528,7 @@
           <a:p>
             <a:fld id="{8FBEF592-9A5F-4028-BE74-EE215189E296}" type="datetimeFigureOut">
               <a:rPr lang="en-US" smtClean="0"/>
-              <a:t>6/22/2021</a:t>
+              <a:t>6/27/2021</a:t>
             </a:fld>
             <a:endParaRPr lang="en-US"/>
           </a:p>
@@ -1938,7 +1940,7 @@
           <a:p>
             <a:fld id="{8FBEF592-9A5F-4028-BE74-EE215189E296}" type="datetimeFigureOut">
               <a:rPr lang="en-US" smtClean="0"/>
-              <a:t>6/22/2021</a:t>
+              <a:t>6/27/2021</a:t>
             </a:fld>
             <a:endParaRPr lang="en-US"/>
           </a:p>
@@ -2079,7 +2081,7 @@
           <a:p>
             <a:fld id="{8FBEF592-9A5F-4028-BE74-EE215189E296}" type="datetimeFigureOut">
               <a:rPr lang="en-US" smtClean="0"/>
-              <a:t>6/22/2021</a:t>
+              <a:t>6/27/2021</a:t>
             </a:fld>
             <a:endParaRPr lang="en-US"/>
           </a:p>
@@ -2192,7 +2194,7 @@
           <a:p>
             <a:fld id="{8FBEF592-9A5F-4028-BE74-EE215189E296}" type="datetimeFigureOut">
               <a:rPr lang="en-US" smtClean="0"/>
-              <a:t>6/22/2021</a:t>
+              <a:t>6/27/2021</a:t>
             </a:fld>
             <a:endParaRPr lang="en-US"/>
           </a:p>
@@ -2503,7 +2505,7 @@
           <a:p>
             <a:fld id="{8FBEF592-9A5F-4028-BE74-EE215189E296}" type="datetimeFigureOut">
               <a:rPr lang="en-US" smtClean="0"/>
-              <a:t>6/22/2021</a:t>
+              <a:t>6/27/2021</a:t>
             </a:fld>
             <a:endParaRPr lang="en-US"/>
           </a:p>
@@ -2791,7 +2793,7 @@
           <a:p>
             <a:fld id="{8FBEF592-9A5F-4028-BE74-EE215189E296}" type="datetimeFigureOut">
               <a:rPr lang="en-US" smtClean="0"/>
-              <a:t>6/22/2021</a:t>
+              <a:t>6/27/2021</a:t>
             </a:fld>
             <a:endParaRPr lang="en-US"/>
           </a:p>
@@ -3032,7 +3034,7 @@
           <a:p>
             <a:fld id="{8FBEF592-9A5F-4028-BE74-EE215189E296}" type="datetimeFigureOut">
               <a:rPr lang="en-US" smtClean="0"/>
-              <a:t>6/22/2021</a:t>
+              <a:t>6/27/2021</a:t>
             </a:fld>
             <a:endParaRPr lang="en-US"/>
           </a:p>
@@ -3777,11 +3779,7 @@
             </a:pPr>
             <a:r>
               <a:rPr lang="en-US" sz="1600" b="1" dirty="0" smtClean="0"/>
-              <a:t>Backend</a:t>
-            </a:r>
-            <a:r>
-              <a:rPr lang="en-US" sz="1600" b="1" dirty="0" smtClean="0"/>
-              <a:t>:</a:t>
+              <a:t>Backend:</a:t>
             </a:r>
             <a:r>
               <a:rPr lang="en-US" sz="1600" dirty="0" smtClean="0"/>
@@ -3795,7 +3793,6 @@
               <a:rPr lang="en-US" sz="1600" dirty="0" smtClean="0"/>
               <a:t> Core, SQL Database, Azure</a:t>
             </a:r>
-            <a:endParaRPr lang="en-US" sz="1600" dirty="0" smtClean="0"/>
           </a:p>
           <a:p>
             <a:pPr marL="342900" indent="-342900">
@@ -3851,6 +3848,1412 @@
       </p:grpSpPr>
       <p:sp>
         <p:nvSpPr>
+          <p:cNvPr id="109" name="Title 1">
+            <a:extLst>
+              <a:ext uri="{FF2B5EF4-FFF2-40B4-BE49-F238E27FC236}">
+                <a16:creationId xmlns:a16="http://schemas.microsoft.com/office/drawing/2014/main" id="{78C07964-174A-4A54-84D3-E88913B49D0E}"/>
+              </a:ext>
+            </a:extLst>
+          </p:cNvPr>
+          <p:cNvSpPr txBox="1">
+            <a:spLocks/>
+          </p:cNvSpPr>
+          <p:nvPr/>
+        </p:nvSpPr>
+        <p:spPr>
+          <a:xfrm>
+            <a:off x="555171" y="-4998"/>
+            <a:ext cx="11070772" cy="1039142"/>
+          </a:xfrm>
+          <a:prstGeom prst="rect">
+            <a:avLst/>
+          </a:prstGeom>
+        </p:spPr>
+        <p:txBody>
+          <a:bodyPr anchor="ctr"/>
+          <a:lstStyle>
+            <a:lvl1pPr algn="l" defTabSz="914400" rtl="0" eaLnBrk="1" latinLnBrk="0" hangingPunct="1">
+              <a:lnSpc>
+                <a:spcPct val="90000"/>
+              </a:lnSpc>
+              <a:spcBef>
+                <a:spcPct val="0"/>
+              </a:spcBef>
+              <a:buNone/>
+              <a:defRPr sz="4400" kern="1200">
+                <a:solidFill>
+                  <a:schemeClr val="tx1"/>
+                </a:solidFill>
+                <a:latin typeface="+mj-lt"/>
+                <a:ea typeface="+mj-ea"/>
+                <a:cs typeface="+mj-cs"/>
+              </a:defRPr>
+            </a:lvl1pPr>
+          </a:lstStyle>
+          <a:p>
+            <a:r>
+              <a:rPr lang="en-US" sz="3600" dirty="0" smtClean="0"/>
+              <a:t>Application Architecture</a:t>
+            </a:r>
+            <a:endParaRPr lang="en-US" sz="3600" dirty="0"/>
+          </a:p>
+        </p:txBody>
+      </p:sp>
+      <p:grpSp>
+        <p:nvGrpSpPr>
+          <p:cNvPr id="15" name="Group 14"/>
+          <p:cNvGrpSpPr/>
+          <p:nvPr/>
+        </p:nvGrpSpPr>
+        <p:grpSpPr>
+          <a:xfrm>
+            <a:off x="6578814" y="1983119"/>
+            <a:ext cx="5047129" cy="2698379"/>
+            <a:chOff x="6002510" y="1983119"/>
+            <a:chExt cx="5047129" cy="2698379"/>
+          </a:xfrm>
+        </p:grpSpPr>
+        <p:sp>
+          <p:nvSpPr>
+            <p:cNvPr id="6" name="Oval 5"/>
+            <p:cNvSpPr/>
+            <p:nvPr/>
+          </p:nvSpPr>
+          <p:spPr>
+            <a:xfrm>
+              <a:off x="6002510" y="1983119"/>
+              <a:ext cx="2841812" cy="2698379"/>
+            </a:xfrm>
+            <a:prstGeom prst="ellipse">
+              <a:avLst/>
+            </a:prstGeom>
+            <a:solidFill>
+              <a:schemeClr val="accent5">
+                <a:lumMod val="50000"/>
+              </a:schemeClr>
+            </a:solidFill>
+          </p:spPr>
+          <p:style>
+            <a:lnRef idx="0">
+              <a:schemeClr val="accent1"/>
+            </a:lnRef>
+            <a:fillRef idx="3">
+              <a:schemeClr val="accent1"/>
+            </a:fillRef>
+            <a:effectRef idx="3">
+              <a:schemeClr val="accent1"/>
+            </a:effectRef>
+            <a:fontRef idx="minor">
+              <a:schemeClr val="lt1"/>
+            </a:fontRef>
+          </p:style>
+          <p:txBody>
+            <a:bodyPr rtlCol="0" anchor="t"/>
+            <a:lstStyle/>
+            <a:p>
+              <a:pPr algn="ctr"/>
+              <a:endParaRPr lang="en-US" sz="1200" dirty="0"/>
+            </a:p>
+          </p:txBody>
+        </p:sp>
+        <p:sp>
+          <p:nvSpPr>
+            <p:cNvPr id="4" name="Oval 3"/>
+            <p:cNvSpPr/>
+            <p:nvPr/>
+          </p:nvSpPr>
+          <p:spPr>
+            <a:xfrm>
+              <a:off x="6477639" y="2449285"/>
+              <a:ext cx="1864659" cy="1766047"/>
+            </a:xfrm>
+            <a:prstGeom prst="ellipse">
+              <a:avLst/>
+            </a:prstGeom>
+            <a:solidFill>
+              <a:schemeClr val="accent4">
+                <a:lumMod val="40000"/>
+                <a:lumOff val="60000"/>
+              </a:schemeClr>
+            </a:solidFill>
+          </p:spPr>
+          <p:style>
+            <a:lnRef idx="0">
+              <a:schemeClr val="accent1"/>
+            </a:lnRef>
+            <a:fillRef idx="3">
+              <a:schemeClr val="accent1"/>
+            </a:fillRef>
+            <a:effectRef idx="3">
+              <a:schemeClr val="accent1"/>
+            </a:effectRef>
+            <a:fontRef idx="minor">
+              <a:schemeClr val="lt1"/>
+            </a:fontRef>
+          </p:style>
+          <p:txBody>
+            <a:bodyPr rtlCol="0" anchor="t"/>
+            <a:lstStyle/>
+            <a:p>
+              <a:pPr algn="ctr"/>
+              <a:endParaRPr lang="en-US" sz="1200" dirty="0"/>
+            </a:p>
+          </p:txBody>
+        </p:sp>
+        <p:sp>
+          <p:nvSpPr>
+            <p:cNvPr id="3" name="Oval 2"/>
+            <p:cNvSpPr/>
+            <p:nvPr/>
+          </p:nvSpPr>
+          <p:spPr>
+            <a:xfrm>
+              <a:off x="6898981" y="2843733"/>
+              <a:ext cx="1013012" cy="959224"/>
+            </a:xfrm>
+            <a:prstGeom prst="ellipse">
+              <a:avLst/>
+            </a:prstGeom>
+            <a:solidFill>
+              <a:schemeClr val="accent6">
+                <a:lumMod val="60000"/>
+                <a:lumOff val="40000"/>
+              </a:schemeClr>
+            </a:solidFill>
+          </p:spPr>
+          <p:style>
+            <a:lnRef idx="0">
+              <a:schemeClr val="accent1"/>
+            </a:lnRef>
+            <a:fillRef idx="3">
+              <a:schemeClr val="accent1"/>
+            </a:fillRef>
+            <a:effectRef idx="3">
+              <a:schemeClr val="accent1"/>
+            </a:effectRef>
+            <a:fontRef idx="minor">
+              <a:schemeClr val="lt1"/>
+            </a:fontRef>
+          </p:style>
+          <p:txBody>
+            <a:bodyPr rtlCol="0" anchor="ctr"/>
+            <a:lstStyle/>
+            <a:p>
+              <a:pPr algn="ctr"/>
+              <a:r>
+                <a:rPr lang="en-US" sz="1200" dirty="0" smtClean="0">
+                  <a:solidFill>
+                    <a:schemeClr val="tx1"/>
+                  </a:solidFill>
+                </a:rPr>
+                <a:t>Domain</a:t>
+              </a:r>
+              <a:endParaRPr lang="en-US" sz="1200" dirty="0">
+                <a:solidFill>
+                  <a:schemeClr val="tx1"/>
+                </a:solidFill>
+              </a:endParaRPr>
+            </a:p>
+          </p:txBody>
+        </p:sp>
+        <p:sp>
+          <p:nvSpPr>
+            <p:cNvPr id="5" name="Rounded Rectangle 4"/>
+            <p:cNvSpPr/>
+            <p:nvPr/>
+          </p:nvSpPr>
+          <p:spPr>
+            <a:xfrm>
+              <a:off x="9830439" y="3085780"/>
+              <a:ext cx="1219200" cy="475129"/>
+            </a:xfrm>
+            <a:prstGeom prst="roundRect">
+              <a:avLst/>
+            </a:prstGeom>
+          </p:spPr>
+          <p:style>
+            <a:lnRef idx="0">
+              <a:schemeClr val="accent1"/>
+            </a:lnRef>
+            <a:fillRef idx="3">
+              <a:schemeClr val="accent1"/>
+            </a:fillRef>
+            <a:effectRef idx="3">
+              <a:schemeClr val="accent1"/>
+            </a:effectRef>
+            <a:fontRef idx="minor">
+              <a:schemeClr val="lt1"/>
+            </a:fontRef>
+          </p:style>
+          <p:txBody>
+            <a:bodyPr rtlCol="0" anchor="ctr"/>
+            <a:lstStyle/>
+            <a:p>
+              <a:pPr algn="ctr"/>
+              <a:r>
+                <a:rPr lang="en-US" sz="1200" dirty="0" smtClean="0"/>
+                <a:t>Persistence</a:t>
+              </a:r>
+              <a:endParaRPr lang="en-US" sz="1200" dirty="0"/>
+            </a:p>
+          </p:txBody>
+        </p:sp>
+        <p:sp>
+          <p:nvSpPr>
+            <p:cNvPr id="7" name="TextBox 6"/>
+            <p:cNvSpPr txBox="1"/>
+            <p:nvPr/>
+          </p:nvSpPr>
+          <p:spPr>
+            <a:xfrm>
+              <a:off x="6978166" y="2508010"/>
+              <a:ext cx="890500" cy="276999"/>
+            </a:xfrm>
+            <a:prstGeom prst="rect">
+              <a:avLst/>
+            </a:prstGeom>
+            <a:noFill/>
+          </p:spPr>
+          <p:txBody>
+            <a:bodyPr wrap="none" rtlCol="0">
+              <a:spAutoFit/>
+            </a:bodyPr>
+            <a:lstStyle/>
+            <a:p>
+              <a:r>
+                <a:rPr lang="en-US" sz="1200" dirty="0" smtClean="0"/>
+                <a:t>Application</a:t>
+              </a:r>
+              <a:endParaRPr lang="en-US" sz="1200" dirty="0"/>
+            </a:p>
+          </p:txBody>
+        </p:sp>
+        <p:sp>
+          <p:nvSpPr>
+            <p:cNvPr id="9" name="TextBox 8"/>
+            <p:cNvSpPr txBox="1"/>
+            <p:nvPr/>
+          </p:nvSpPr>
+          <p:spPr>
+            <a:xfrm>
+              <a:off x="7208959" y="2073673"/>
+              <a:ext cx="393056" cy="276999"/>
+            </a:xfrm>
+            <a:prstGeom prst="rect">
+              <a:avLst/>
+            </a:prstGeom>
+            <a:noFill/>
+          </p:spPr>
+          <p:txBody>
+            <a:bodyPr wrap="none" rtlCol="0">
+              <a:spAutoFit/>
+            </a:bodyPr>
+            <a:lstStyle/>
+            <a:p>
+              <a:r>
+                <a:rPr lang="en-US" sz="1200" dirty="0" smtClean="0">
+                  <a:solidFill>
+                    <a:schemeClr val="bg1"/>
+                  </a:solidFill>
+                </a:rPr>
+                <a:t>API</a:t>
+              </a:r>
+              <a:endParaRPr lang="en-US" sz="1200" dirty="0">
+                <a:solidFill>
+                  <a:schemeClr val="bg1"/>
+                </a:solidFill>
+              </a:endParaRPr>
+            </a:p>
+          </p:txBody>
+        </p:sp>
+        <p:sp>
+          <p:nvSpPr>
+            <p:cNvPr id="8" name="Down Arrow 7"/>
+            <p:cNvSpPr/>
+            <p:nvPr/>
+          </p:nvSpPr>
+          <p:spPr>
+            <a:xfrm>
+              <a:off x="7330780" y="2758115"/>
+              <a:ext cx="149414" cy="182880"/>
+            </a:xfrm>
+            <a:prstGeom prst="downArrow">
+              <a:avLst/>
+            </a:prstGeom>
+            <a:solidFill>
+              <a:srgbClr val="FFC000"/>
+            </a:solidFill>
+            <a:effectLst>
+              <a:outerShdw blurRad="50800" dist="38100" dir="2700000" algn="tl" rotWithShape="0">
+                <a:prstClr val="black">
+                  <a:alpha val="40000"/>
+                </a:prstClr>
+              </a:outerShdw>
+            </a:effectLst>
+          </p:spPr>
+          <p:style>
+            <a:lnRef idx="2">
+              <a:schemeClr val="accent1">
+                <a:shade val="50000"/>
+              </a:schemeClr>
+            </a:lnRef>
+            <a:fillRef idx="1">
+              <a:schemeClr val="accent1"/>
+            </a:fillRef>
+            <a:effectRef idx="0">
+              <a:schemeClr val="accent1"/>
+            </a:effectRef>
+            <a:fontRef idx="minor">
+              <a:schemeClr val="lt1"/>
+            </a:fontRef>
+          </p:style>
+          <p:txBody>
+            <a:bodyPr rtlCol="0" anchor="ctr"/>
+            <a:lstStyle/>
+            <a:p>
+              <a:pPr algn="ctr"/>
+              <a:endParaRPr lang="en-US"/>
+            </a:p>
+          </p:txBody>
+        </p:sp>
+        <p:sp>
+          <p:nvSpPr>
+            <p:cNvPr id="11" name="Down Arrow 10"/>
+            <p:cNvSpPr/>
+            <p:nvPr/>
+          </p:nvSpPr>
+          <p:spPr>
+            <a:xfrm>
+              <a:off x="7330780" y="2323555"/>
+              <a:ext cx="149414" cy="182880"/>
+            </a:xfrm>
+            <a:prstGeom prst="downArrow">
+              <a:avLst/>
+            </a:prstGeom>
+            <a:solidFill>
+              <a:srgbClr val="FFC000"/>
+            </a:solidFill>
+            <a:effectLst>
+              <a:outerShdw blurRad="50800" dist="38100" dir="2700000" algn="tl" rotWithShape="0">
+                <a:prstClr val="black">
+                  <a:alpha val="40000"/>
+                </a:prstClr>
+              </a:outerShdw>
+            </a:effectLst>
+          </p:spPr>
+          <p:style>
+            <a:lnRef idx="2">
+              <a:schemeClr val="accent1">
+                <a:shade val="50000"/>
+              </a:schemeClr>
+            </a:lnRef>
+            <a:fillRef idx="1">
+              <a:schemeClr val="accent1"/>
+            </a:fillRef>
+            <a:effectRef idx="0">
+              <a:schemeClr val="accent1"/>
+            </a:effectRef>
+            <a:fontRef idx="minor">
+              <a:schemeClr val="lt1"/>
+            </a:fontRef>
+          </p:style>
+          <p:txBody>
+            <a:bodyPr rtlCol="0" anchor="ctr"/>
+            <a:lstStyle/>
+            <a:p>
+              <a:pPr algn="ctr"/>
+              <a:endParaRPr lang="en-US"/>
+            </a:p>
+          </p:txBody>
+        </p:sp>
+        <p:sp>
+          <p:nvSpPr>
+            <p:cNvPr id="12" name="Left Arrow 11"/>
+            <p:cNvSpPr/>
+            <p:nvPr/>
+          </p:nvSpPr>
+          <p:spPr>
+            <a:xfrm>
+              <a:off x="7777522" y="3157498"/>
+              <a:ext cx="1927412" cy="182880"/>
+            </a:xfrm>
+            <a:prstGeom prst="leftArrow">
+              <a:avLst/>
+            </a:prstGeom>
+            <a:solidFill>
+              <a:srgbClr val="FFC000"/>
+            </a:solidFill>
+            <a:effectLst>
+              <a:outerShdw blurRad="50800" dist="38100" dir="2700000" algn="tl" rotWithShape="0">
+                <a:prstClr val="black">
+                  <a:alpha val="40000"/>
+                </a:prstClr>
+              </a:outerShdw>
+            </a:effectLst>
+          </p:spPr>
+          <p:style>
+            <a:lnRef idx="2">
+              <a:schemeClr val="accent1">
+                <a:shade val="50000"/>
+              </a:schemeClr>
+            </a:lnRef>
+            <a:fillRef idx="1">
+              <a:schemeClr val="accent1"/>
+            </a:fillRef>
+            <a:effectRef idx="0">
+              <a:schemeClr val="accent1"/>
+            </a:effectRef>
+            <a:fontRef idx="minor">
+              <a:schemeClr val="lt1"/>
+            </a:fontRef>
+          </p:style>
+          <p:txBody>
+            <a:bodyPr rtlCol="0" anchor="ctr"/>
+            <a:lstStyle/>
+            <a:p>
+              <a:pPr algn="ctr"/>
+              <a:endParaRPr lang="en-US"/>
+            </a:p>
+          </p:txBody>
+        </p:sp>
+        <p:sp>
+          <p:nvSpPr>
+            <p:cNvPr id="13" name="Right Arrow 12"/>
+            <p:cNvSpPr/>
+            <p:nvPr/>
+          </p:nvSpPr>
+          <p:spPr>
+            <a:xfrm>
+              <a:off x="8118181" y="3392820"/>
+              <a:ext cx="1586753" cy="182880"/>
+            </a:xfrm>
+            <a:prstGeom prst="rightArrow">
+              <a:avLst/>
+            </a:prstGeom>
+            <a:solidFill>
+              <a:srgbClr val="FFC000"/>
+            </a:solidFill>
+            <a:effectLst>
+              <a:outerShdw blurRad="50800" dist="38100" dir="2700000" algn="tl" rotWithShape="0">
+                <a:prstClr val="black">
+                  <a:alpha val="40000"/>
+                </a:prstClr>
+              </a:outerShdw>
+            </a:effectLst>
+          </p:spPr>
+          <p:style>
+            <a:lnRef idx="2">
+              <a:schemeClr val="accent1">
+                <a:shade val="50000"/>
+              </a:schemeClr>
+            </a:lnRef>
+            <a:fillRef idx="1">
+              <a:schemeClr val="accent1"/>
+            </a:fillRef>
+            <a:effectRef idx="0">
+              <a:schemeClr val="accent1"/>
+            </a:effectRef>
+            <a:fontRef idx="minor">
+              <a:schemeClr val="lt1"/>
+            </a:fontRef>
+          </p:style>
+          <p:txBody>
+            <a:bodyPr rtlCol="0" anchor="ctr"/>
+            <a:lstStyle/>
+            <a:p>
+              <a:pPr algn="ctr"/>
+              <a:endParaRPr lang="en-US"/>
+            </a:p>
+          </p:txBody>
+        </p:sp>
+      </p:grpSp>
+      <p:sp>
+        <p:nvSpPr>
+          <p:cNvPr id="14" name="TextBox 13"/>
+          <p:cNvSpPr txBox="1"/>
+          <p:nvPr/>
+        </p:nvSpPr>
+        <p:spPr>
+          <a:xfrm>
+            <a:off x="555171" y="1230086"/>
+            <a:ext cx="5817455" cy="2492990"/>
+          </a:xfrm>
+          <a:prstGeom prst="rect">
+            <a:avLst/>
+          </a:prstGeom>
+          <a:noFill/>
+        </p:spPr>
+        <p:txBody>
+          <a:bodyPr wrap="square" rtlCol="0">
+            <a:spAutoFit/>
+          </a:bodyPr>
+          <a:lstStyle/>
+          <a:p>
+            <a:r>
+              <a:rPr lang="en-US" sz="1600" b="1" dirty="0" smtClean="0"/>
+              <a:t>Clean architecture layers (Onion view)</a:t>
+            </a:r>
+          </a:p>
+          <a:p>
+            <a:r>
+              <a:rPr lang="en-US" sz="1400" dirty="0"/>
+              <a:t>Clean architecture puts the business logic and application model at the center of the application</a:t>
+            </a:r>
+            <a:r>
+              <a:rPr lang="en-US" sz="1400" dirty="0" smtClean="0"/>
+              <a:t>.</a:t>
+            </a:r>
+          </a:p>
+          <a:p>
+            <a:endParaRPr lang="en-US" sz="1400" dirty="0" smtClean="0"/>
+          </a:p>
+          <a:p>
+            <a:pPr marL="285750" indent="-285750">
+              <a:buFont typeface="Arial" panose="020B0604020202020204" pitchFamily="34" charset="0"/>
+              <a:buChar char="•"/>
+            </a:pPr>
+            <a:r>
+              <a:rPr lang="en-US" sz="1400" dirty="0" smtClean="0"/>
+              <a:t>Domain centric (domain entities), it has no dependencies</a:t>
+            </a:r>
+          </a:p>
+          <a:p>
+            <a:pPr marL="285750" indent="-285750">
+              <a:buFont typeface="Arial" panose="020B0604020202020204" pitchFamily="34" charset="0"/>
+              <a:buChar char="•"/>
+            </a:pPr>
+            <a:r>
+              <a:rPr lang="en-US" sz="1400" dirty="0" smtClean="0"/>
+              <a:t>Application layer sits above the Domain layer. This layer contains all the business logic and it will have dependency on the Domain and Persistence</a:t>
+            </a:r>
+          </a:p>
+          <a:p>
+            <a:pPr marL="285750" indent="-285750">
+              <a:buFont typeface="Arial" panose="020B0604020202020204" pitchFamily="34" charset="0"/>
+              <a:buChar char="•"/>
+            </a:pPr>
+            <a:r>
+              <a:rPr lang="en-US" sz="1400" dirty="0" smtClean="0"/>
+              <a:t>API layer sits above the Application layer.</a:t>
+            </a:r>
+            <a:endParaRPr lang="en-US" sz="1400" dirty="0"/>
+          </a:p>
+          <a:p>
+            <a:pPr marL="285750" indent="-285750">
+              <a:buFont typeface="Arial" panose="020B0604020202020204" pitchFamily="34" charset="0"/>
+              <a:buChar char="•"/>
+            </a:pPr>
+            <a:r>
+              <a:rPr lang="en-US" sz="1400" dirty="0" smtClean="0"/>
+              <a:t>Persistence layer, will have dependency on the Domain (access to the entities)</a:t>
+            </a:r>
+          </a:p>
+          <a:p>
+            <a:pPr marL="285750" indent="-285750">
+              <a:buFont typeface="Arial" panose="020B0604020202020204" pitchFamily="34" charset="0"/>
+              <a:buChar char="•"/>
+            </a:pPr>
+            <a:endParaRPr lang="en-US" sz="1400" dirty="0"/>
+          </a:p>
+        </p:txBody>
+      </p:sp>
+    </p:spTree>
+    <p:extLst>
+      <p:ext uri="{BB962C8B-B14F-4D97-AF65-F5344CB8AC3E}">
+        <p14:creationId xmlns:p14="http://schemas.microsoft.com/office/powerpoint/2010/main" val="4119689304"/>
+      </p:ext>
+    </p:extLst>
+  </p:cSld>
+  <p:clrMapOvr>
+    <a:masterClrMapping/>
+  </p:clrMapOvr>
+  <p:timing>
+    <p:tnLst>
+      <p:par>
+        <p:cTn id="1" dur="indefinite" restart="never" nodeType="tmRoot"/>
+      </p:par>
+    </p:tnLst>
+  </p:timing>
+</p:sld>
+</file>
+
+<file path=ppt/slides/slide5.xml><?xml version="1.0" encoding="utf-8"?>
+<p:sld xmlns:a="http://schemas.openxmlformats.org/drawingml/2006/main" xmlns:r="http://schemas.openxmlformats.org/officeDocument/2006/relationships" xmlns:p="http://schemas.openxmlformats.org/presentationml/2006/main">
+  <p:cSld>
+    <p:spTree>
+      <p:nvGrpSpPr>
+        <p:cNvPr id="1" name=""/>
+        <p:cNvGrpSpPr/>
+        <p:nvPr/>
+      </p:nvGrpSpPr>
+      <p:grpSpPr>
+        <a:xfrm>
+          <a:off x="0" y="0"/>
+          <a:ext cx="0" cy="0"/>
+          <a:chOff x="0" y="0"/>
+          <a:chExt cx="0" cy="0"/>
+        </a:xfrm>
+      </p:grpSpPr>
+      <p:sp>
+        <p:nvSpPr>
+          <p:cNvPr id="109" name="Title 1">
+            <a:extLst>
+              <a:ext uri="{FF2B5EF4-FFF2-40B4-BE49-F238E27FC236}">
+                <a16:creationId xmlns:a16="http://schemas.microsoft.com/office/drawing/2014/main" id="{78C07964-174A-4A54-84D3-E88913B49D0E}"/>
+              </a:ext>
+            </a:extLst>
+          </p:cNvPr>
+          <p:cNvSpPr txBox="1">
+            <a:spLocks/>
+          </p:cNvSpPr>
+          <p:nvPr/>
+        </p:nvSpPr>
+        <p:spPr>
+          <a:xfrm>
+            <a:off x="555171" y="-4998"/>
+            <a:ext cx="11070772" cy="1039142"/>
+          </a:xfrm>
+          <a:prstGeom prst="rect">
+            <a:avLst/>
+          </a:prstGeom>
+        </p:spPr>
+        <p:txBody>
+          <a:bodyPr anchor="ctr"/>
+          <a:lstStyle>
+            <a:lvl1pPr algn="l" defTabSz="914400" rtl="0" eaLnBrk="1" latinLnBrk="0" hangingPunct="1">
+              <a:lnSpc>
+                <a:spcPct val="90000"/>
+              </a:lnSpc>
+              <a:spcBef>
+                <a:spcPct val="0"/>
+              </a:spcBef>
+              <a:buNone/>
+              <a:defRPr sz="4400" kern="1200">
+                <a:solidFill>
+                  <a:schemeClr val="tx1"/>
+                </a:solidFill>
+                <a:latin typeface="+mj-lt"/>
+                <a:ea typeface="+mj-ea"/>
+                <a:cs typeface="+mj-cs"/>
+              </a:defRPr>
+            </a:lvl1pPr>
+          </a:lstStyle>
+          <a:p>
+            <a:r>
+              <a:rPr lang="en-US" sz="3600" dirty="0" smtClean="0"/>
+              <a:t>Application projects</a:t>
+            </a:r>
+            <a:endParaRPr lang="en-US" sz="3600" dirty="0"/>
+          </a:p>
+        </p:txBody>
+      </p:sp>
+      <p:sp>
+        <p:nvSpPr>
+          <p:cNvPr id="14" name="TextBox 13"/>
+          <p:cNvSpPr txBox="1"/>
+          <p:nvPr/>
+        </p:nvSpPr>
+        <p:spPr>
+          <a:xfrm>
+            <a:off x="555171" y="1230086"/>
+            <a:ext cx="5535065" cy="369332"/>
+          </a:xfrm>
+          <a:prstGeom prst="rect">
+            <a:avLst/>
+          </a:prstGeom>
+          <a:noFill/>
+        </p:spPr>
+        <p:txBody>
+          <a:bodyPr wrap="square" rtlCol="0">
+            <a:spAutoFit/>
+          </a:bodyPr>
+          <a:lstStyle/>
+          <a:p>
+            <a:r>
+              <a:rPr lang="en-US" dirty="0"/>
+              <a:t>&gt;</a:t>
+            </a:r>
+          </a:p>
+        </p:txBody>
+      </p:sp>
+      <p:grpSp>
+        <p:nvGrpSpPr>
+          <p:cNvPr id="33" name="Group 32"/>
+          <p:cNvGrpSpPr/>
+          <p:nvPr/>
+        </p:nvGrpSpPr>
+        <p:grpSpPr>
+          <a:xfrm>
+            <a:off x="6882652" y="1230086"/>
+            <a:ext cx="4613301" cy="4111405"/>
+            <a:chOff x="6882652" y="1230086"/>
+            <a:chExt cx="4613301" cy="4111405"/>
+          </a:xfrm>
+        </p:grpSpPr>
+        <p:sp>
+          <p:nvSpPr>
+            <p:cNvPr id="16" name="Rounded Rectangle 15"/>
+            <p:cNvSpPr/>
+            <p:nvPr/>
+          </p:nvSpPr>
+          <p:spPr>
+            <a:xfrm>
+              <a:off x="9982839" y="2140519"/>
+              <a:ext cx="1219200" cy="475129"/>
+            </a:xfrm>
+            <a:prstGeom prst="roundRect">
+              <a:avLst/>
+            </a:prstGeom>
+            <a:solidFill>
+              <a:schemeClr val="accent5">
+                <a:lumMod val="50000"/>
+              </a:schemeClr>
+            </a:solidFill>
+          </p:spPr>
+          <p:style>
+            <a:lnRef idx="0">
+              <a:schemeClr val="accent1"/>
+            </a:lnRef>
+            <a:fillRef idx="3">
+              <a:schemeClr val="accent1"/>
+            </a:fillRef>
+            <a:effectRef idx="3">
+              <a:schemeClr val="accent1"/>
+            </a:effectRef>
+            <a:fontRef idx="minor">
+              <a:schemeClr val="lt1"/>
+            </a:fontRef>
+          </p:style>
+          <p:txBody>
+            <a:bodyPr rtlCol="0" anchor="ctr"/>
+            <a:lstStyle/>
+            <a:p>
+              <a:pPr algn="ctr"/>
+              <a:r>
+                <a:rPr lang="en-US" sz="1200" dirty="0" smtClean="0">
+                  <a:solidFill>
+                    <a:schemeClr val="bg1"/>
+                  </a:solidFill>
+                </a:rPr>
+                <a:t>API</a:t>
+              </a:r>
+              <a:endParaRPr lang="en-US" sz="1200" dirty="0">
+                <a:solidFill>
+                  <a:schemeClr val="bg1"/>
+                </a:solidFill>
+              </a:endParaRPr>
+            </a:p>
+          </p:txBody>
+        </p:sp>
+        <p:sp>
+          <p:nvSpPr>
+            <p:cNvPr id="17" name="Rounded Rectangle 16"/>
+            <p:cNvSpPr/>
+            <p:nvPr/>
+          </p:nvSpPr>
+          <p:spPr>
+            <a:xfrm>
+              <a:off x="9982839" y="2956948"/>
+              <a:ext cx="1219200" cy="475129"/>
+            </a:xfrm>
+            <a:prstGeom prst="roundRect">
+              <a:avLst/>
+            </a:prstGeom>
+            <a:solidFill>
+              <a:schemeClr val="accent5">
+                <a:lumMod val="50000"/>
+              </a:schemeClr>
+            </a:solidFill>
+          </p:spPr>
+          <p:style>
+            <a:lnRef idx="0">
+              <a:schemeClr val="accent1"/>
+            </a:lnRef>
+            <a:fillRef idx="3">
+              <a:schemeClr val="accent1"/>
+            </a:fillRef>
+            <a:effectRef idx="3">
+              <a:schemeClr val="accent1"/>
+            </a:effectRef>
+            <a:fontRef idx="minor">
+              <a:schemeClr val="lt1"/>
+            </a:fontRef>
+          </p:style>
+          <p:txBody>
+            <a:bodyPr rtlCol="0" anchor="ctr"/>
+            <a:lstStyle/>
+            <a:p>
+              <a:pPr algn="ctr"/>
+              <a:r>
+                <a:rPr lang="en-US" sz="1200" dirty="0" smtClean="0">
+                  <a:solidFill>
+                    <a:schemeClr val="bg1"/>
+                  </a:solidFill>
+                </a:rPr>
+                <a:t>Application</a:t>
+              </a:r>
+              <a:endParaRPr lang="en-US" sz="1200" dirty="0">
+                <a:solidFill>
+                  <a:schemeClr val="bg1"/>
+                </a:solidFill>
+              </a:endParaRPr>
+            </a:p>
+          </p:txBody>
+        </p:sp>
+        <p:sp>
+          <p:nvSpPr>
+            <p:cNvPr id="18" name="Rounded Rectangle 17"/>
+            <p:cNvSpPr/>
+            <p:nvPr/>
+          </p:nvSpPr>
+          <p:spPr>
+            <a:xfrm>
+              <a:off x="9982839" y="3773377"/>
+              <a:ext cx="1219200" cy="475129"/>
+            </a:xfrm>
+            <a:prstGeom prst="roundRect">
+              <a:avLst/>
+            </a:prstGeom>
+            <a:solidFill>
+              <a:schemeClr val="accent5">
+                <a:lumMod val="50000"/>
+              </a:schemeClr>
+            </a:solidFill>
+          </p:spPr>
+          <p:style>
+            <a:lnRef idx="0">
+              <a:schemeClr val="accent1"/>
+            </a:lnRef>
+            <a:fillRef idx="3">
+              <a:schemeClr val="accent1"/>
+            </a:fillRef>
+            <a:effectRef idx="3">
+              <a:schemeClr val="accent1"/>
+            </a:effectRef>
+            <a:fontRef idx="minor">
+              <a:schemeClr val="lt1"/>
+            </a:fontRef>
+          </p:style>
+          <p:txBody>
+            <a:bodyPr rtlCol="0" anchor="ctr"/>
+            <a:lstStyle/>
+            <a:p>
+              <a:pPr algn="ctr"/>
+              <a:r>
+                <a:rPr lang="en-US" sz="1200" dirty="0" smtClean="0">
+                  <a:solidFill>
+                    <a:schemeClr val="bg1"/>
+                  </a:solidFill>
+                </a:rPr>
+                <a:t>Domain</a:t>
+              </a:r>
+              <a:endParaRPr lang="en-US" sz="1200" dirty="0">
+                <a:solidFill>
+                  <a:schemeClr val="bg1"/>
+                </a:solidFill>
+              </a:endParaRPr>
+            </a:p>
+          </p:txBody>
+        </p:sp>
+        <p:sp>
+          <p:nvSpPr>
+            <p:cNvPr id="19" name="Rounded Rectangle 18"/>
+            <p:cNvSpPr/>
+            <p:nvPr/>
+          </p:nvSpPr>
+          <p:spPr>
+            <a:xfrm>
+              <a:off x="8056067" y="3789048"/>
+              <a:ext cx="1219200" cy="475129"/>
+            </a:xfrm>
+            <a:prstGeom prst="roundRect">
+              <a:avLst/>
+            </a:prstGeom>
+            <a:solidFill>
+              <a:schemeClr val="accent5">
+                <a:lumMod val="50000"/>
+              </a:schemeClr>
+            </a:solidFill>
+          </p:spPr>
+          <p:style>
+            <a:lnRef idx="0">
+              <a:schemeClr val="accent1"/>
+            </a:lnRef>
+            <a:fillRef idx="3">
+              <a:schemeClr val="accent1"/>
+            </a:fillRef>
+            <a:effectRef idx="3">
+              <a:schemeClr val="accent1"/>
+            </a:effectRef>
+            <a:fontRef idx="minor">
+              <a:schemeClr val="lt1"/>
+            </a:fontRef>
+          </p:style>
+          <p:txBody>
+            <a:bodyPr rtlCol="0" anchor="ctr"/>
+            <a:lstStyle/>
+            <a:p>
+              <a:pPr algn="ctr"/>
+              <a:r>
+                <a:rPr lang="en-US" sz="1200" dirty="0" err="1" smtClean="0">
+                  <a:solidFill>
+                    <a:schemeClr val="bg1"/>
+                  </a:solidFill>
+                </a:rPr>
+                <a:t>Perrsistence</a:t>
+              </a:r>
+              <a:endParaRPr lang="en-US" sz="1200" dirty="0">
+                <a:solidFill>
+                  <a:schemeClr val="bg1"/>
+                </a:solidFill>
+              </a:endParaRPr>
+            </a:p>
+          </p:txBody>
+        </p:sp>
+        <p:cxnSp>
+          <p:nvCxnSpPr>
+            <p:cNvPr id="24" name="Straight Arrow Connector 23"/>
+            <p:cNvCxnSpPr>
+              <a:stCxn id="16" idx="2"/>
+              <a:endCxn id="17" idx="0"/>
+            </p:cNvCxnSpPr>
+            <p:nvPr/>
+          </p:nvCxnSpPr>
+          <p:spPr>
+            <a:xfrm>
+              <a:off x="10592439" y="2615648"/>
+              <a:ext cx="0" cy="341300"/>
+            </a:xfrm>
+            <a:prstGeom prst="straightConnector1">
+              <a:avLst/>
+            </a:prstGeom>
+            <a:ln w="41275">
+              <a:solidFill>
+                <a:srgbClr val="7030A0"/>
+              </a:solidFill>
+              <a:tailEnd type="triangle"/>
+            </a:ln>
+          </p:spPr>
+          <p:style>
+            <a:lnRef idx="1">
+              <a:schemeClr val="accent1"/>
+            </a:lnRef>
+            <a:fillRef idx="0">
+              <a:schemeClr val="accent1"/>
+            </a:fillRef>
+            <a:effectRef idx="0">
+              <a:schemeClr val="accent1"/>
+            </a:effectRef>
+            <a:fontRef idx="minor">
+              <a:schemeClr val="tx1"/>
+            </a:fontRef>
+          </p:style>
+        </p:cxnSp>
+        <p:cxnSp>
+          <p:nvCxnSpPr>
+            <p:cNvPr id="26" name="Straight Arrow Connector 25"/>
+            <p:cNvCxnSpPr>
+              <a:stCxn id="17" idx="2"/>
+              <a:endCxn id="18" idx="0"/>
+            </p:cNvCxnSpPr>
+            <p:nvPr/>
+          </p:nvCxnSpPr>
+          <p:spPr>
+            <a:xfrm>
+              <a:off x="10592439" y="3432077"/>
+              <a:ext cx="0" cy="341300"/>
+            </a:xfrm>
+            <a:prstGeom prst="straightConnector1">
+              <a:avLst/>
+            </a:prstGeom>
+            <a:ln w="41275">
+              <a:solidFill>
+                <a:srgbClr val="7030A0"/>
+              </a:solidFill>
+              <a:tailEnd type="triangle"/>
+            </a:ln>
+          </p:spPr>
+          <p:style>
+            <a:lnRef idx="1">
+              <a:schemeClr val="accent1"/>
+            </a:lnRef>
+            <a:fillRef idx="0">
+              <a:schemeClr val="accent1"/>
+            </a:fillRef>
+            <a:effectRef idx="0">
+              <a:schemeClr val="accent1"/>
+            </a:effectRef>
+            <a:fontRef idx="minor">
+              <a:schemeClr val="tx1"/>
+            </a:fontRef>
+          </p:style>
+        </p:cxnSp>
+        <p:cxnSp>
+          <p:nvCxnSpPr>
+            <p:cNvPr id="28" name="Straight Arrow Connector 27"/>
+            <p:cNvCxnSpPr>
+              <a:stCxn id="19" idx="3"/>
+              <a:endCxn id="18" idx="1"/>
+            </p:cNvCxnSpPr>
+            <p:nvPr/>
+          </p:nvCxnSpPr>
+          <p:spPr>
+            <a:xfrm flipV="1">
+              <a:off x="9275267" y="4010942"/>
+              <a:ext cx="707572" cy="15671"/>
+            </a:xfrm>
+            <a:prstGeom prst="straightConnector1">
+              <a:avLst/>
+            </a:prstGeom>
+            <a:ln w="41275">
+              <a:solidFill>
+                <a:srgbClr val="7030A0"/>
+              </a:solidFill>
+              <a:tailEnd type="triangle"/>
+            </a:ln>
+          </p:spPr>
+          <p:style>
+            <a:lnRef idx="1">
+              <a:schemeClr val="accent1"/>
+            </a:lnRef>
+            <a:fillRef idx="0">
+              <a:schemeClr val="accent1"/>
+            </a:fillRef>
+            <a:effectRef idx="0">
+              <a:schemeClr val="accent1"/>
+            </a:effectRef>
+            <a:fontRef idx="minor">
+              <a:schemeClr val="tx1"/>
+            </a:fontRef>
+          </p:style>
+        </p:cxnSp>
+        <p:cxnSp>
+          <p:nvCxnSpPr>
+            <p:cNvPr id="30" name="Straight Arrow Connector 29"/>
+            <p:cNvCxnSpPr>
+              <a:stCxn id="17" idx="1"/>
+              <a:endCxn id="19" idx="0"/>
+            </p:cNvCxnSpPr>
+            <p:nvPr/>
+          </p:nvCxnSpPr>
+          <p:spPr>
+            <a:xfrm flipH="1">
+              <a:off x="8665667" y="3194513"/>
+              <a:ext cx="1317172" cy="594535"/>
+            </a:xfrm>
+            <a:prstGeom prst="straightConnector1">
+              <a:avLst/>
+            </a:prstGeom>
+            <a:ln w="41275">
+              <a:solidFill>
+                <a:srgbClr val="7030A0"/>
+              </a:solidFill>
+              <a:tailEnd type="triangle"/>
+            </a:ln>
+          </p:spPr>
+          <p:style>
+            <a:lnRef idx="1">
+              <a:schemeClr val="accent1"/>
+            </a:lnRef>
+            <a:fillRef idx="0">
+              <a:schemeClr val="accent1"/>
+            </a:fillRef>
+            <a:effectRef idx="0">
+              <a:schemeClr val="accent1"/>
+            </a:effectRef>
+            <a:fontRef idx="minor">
+              <a:schemeClr val="tx1"/>
+            </a:fontRef>
+          </p:style>
+        </p:cxnSp>
+        <p:sp>
+          <p:nvSpPr>
+            <p:cNvPr id="32" name="Rounded Rectangular Callout 31"/>
+            <p:cNvSpPr/>
+            <p:nvPr/>
+          </p:nvSpPr>
+          <p:spPr>
+            <a:xfrm>
+              <a:off x="8349343" y="1230086"/>
+              <a:ext cx="1513114" cy="555172"/>
+            </a:xfrm>
+            <a:prstGeom prst="wedgeRoundRectCallout">
+              <a:avLst>
+                <a:gd name="adj1" fmla="val 55710"/>
+                <a:gd name="adj2" fmla="val 121324"/>
+                <a:gd name="adj3" fmla="val 16667"/>
+              </a:avLst>
+            </a:prstGeom>
+            <a:solidFill>
+              <a:schemeClr val="accent4">
+                <a:lumMod val="20000"/>
+                <a:lumOff val="80000"/>
+              </a:schemeClr>
+            </a:solidFill>
+          </p:spPr>
+          <p:style>
+            <a:lnRef idx="2">
+              <a:schemeClr val="accent1">
+                <a:shade val="50000"/>
+              </a:schemeClr>
+            </a:lnRef>
+            <a:fillRef idx="1">
+              <a:schemeClr val="accent1"/>
+            </a:fillRef>
+            <a:effectRef idx="0">
+              <a:schemeClr val="accent1"/>
+            </a:effectRef>
+            <a:fontRef idx="minor">
+              <a:schemeClr val="lt1"/>
+            </a:fontRef>
+          </p:style>
+          <p:txBody>
+            <a:bodyPr rtlCol="0" anchor="ctr"/>
+            <a:lstStyle/>
+            <a:p>
+              <a:pPr algn="ctr"/>
+              <a:r>
+                <a:rPr lang="en-US" sz="1000" dirty="0" smtClean="0">
+                  <a:solidFill>
+                    <a:schemeClr val="tx1"/>
+                  </a:solidFill>
+                </a:rPr>
+                <a:t>I receive HTTP requests and respond to them.</a:t>
+              </a:r>
+              <a:endParaRPr lang="en-US" sz="1000" dirty="0">
+                <a:solidFill>
+                  <a:schemeClr val="tx1"/>
+                </a:solidFill>
+              </a:endParaRPr>
+            </a:p>
+          </p:txBody>
+        </p:sp>
+        <p:sp>
+          <p:nvSpPr>
+            <p:cNvPr id="34" name="Rounded Rectangular Callout 33"/>
+            <p:cNvSpPr/>
+            <p:nvPr/>
+          </p:nvSpPr>
+          <p:spPr>
+            <a:xfrm>
+              <a:off x="7560767" y="2441798"/>
+              <a:ext cx="1513114" cy="555172"/>
+            </a:xfrm>
+            <a:prstGeom prst="wedgeRoundRectCallout">
+              <a:avLst>
+                <a:gd name="adj1" fmla="val 108948"/>
+                <a:gd name="adj2" fmla="val 50735"/>
+                <a:gd name="adj3" fmla="val 16667"/>
+              </a:avLst>
+            </a:prstGeom>
+            <a:solidFill>
+              <a:schemeClr val="accent4">
+                <a:lumMod val="20000"/>
+                <a:lumOff val="80000"/>
+              </a:schemeClr>
+            </a:solidFill>
+          </p:spPr>
+          <p:style>
+            <a:lnRef idx="2">
+              <a:schemeClr val="accent1">
+                <a:shade val="50000"/>
+              </a:schemeClr>
+            </a:lnRef>
+            <a:fillRef idx="1">
+              <a:schemeClr val="accent1"/>
+            </a:fillRef>
+            <a:effectRef idx="0">
+              <a:schemeClr val="accent1"/>
+            </a:effectRef>
+            <a:fontRef idx="minor">
+              <a:schemeClr val="lt1"/>
+            </a:fontRef>
+          </p:style>
+          <p:txBody>
+            <a:bodyPr rtlCol="0" anchor="ctr"/>
+            <a:lstStyle/>
+            <a:p>
+              <a:pPr algn="ctr"/>
+              <a:r>
+                <a:rPr lang="en-US" sz="1000" dirty="0" smtClean="0">
+                  <a:solidFill>
+                    <a:schemeClr val="tx1"/>
+                  </a:solidFill>
+                </a:rPr>
+                <a:t>I process business logic</a:t>
+              </a:r>
+              <a:endParaRPr lang="en-US" sz="1000" dirty="0">
+                <a:solidFill>
+                  <a:schemeClr val="tx1"/>
+                </a:solidFill>
+              </a:endParaRPr>
+            </a:p>
+          </p:txBody>
+        </p:sp>
+        <p:sp>
+          <p:nvSpPr>
+            <p:cNvPr id="35" name="Rounded Rectangular Callout 34"/>
+            <p:cNvSpPr/>
+            <p:nvPr/>
+          </p:nvSpPr>
+          <p:spPr>
+            <a:xfrm>
+              <a:off x="9982839" y="4786319"/>
+              <a:ext cx="1513114" cy="555172"/>
+            </a:xfrm>
+            <a:prstGeom prst="wedgeRoundRectCallout">
+              <a:avLst>
+                <a:gd name="adj1" fmla="val -6880"/>
+                <a:gd name="adj2" fmla="val -145342"/>
+                <a:gd name="adj3" fmla="val 16667"/>
+              </a:avLst>
+            </a:prstGeom>
+            <a:solidFill>
+              <a:schemeClr val="accent4">
+                <a:lumMod val="20000"/>
+                <a:lumOff val="80000"/>
+              </a:schemeClr>
+            </a:solidFill>
+          </p:spPr>
+          <p:style>
+            <a:lnRef idx="2">
+              <a:schemeClr val="accent1">
+                <a:shade val="50000"/>
+              </a:schemeClr>
+            </a:lnRef>
+            <a:fillRef idx="1">
+              <a:schemeClr val="accent1"/>
+            </a:fillRef>
+            <a:effectRef idx="0">
+              <a:schemeClr val="accent1"/>
+            </a:effectRef>
+            <a:fontRef idx="minor">
+              <a:schemeClr val="lt1"/>
+            </a:fontRef>
+          </p:style>
+          <p:txBody>
+            <a:bodyPr rtlCol="0" anchor="ctr"/>
+            <a:lstStyle/>
+            <a:p>
+              <a:pPr algn="ctr"/>
+              <a:r>
+                <a:rPr lang="en-US" sz="1000" dirty="0" smtClean="0">
+                  <a:solidFill>
+                    <a:schemeClr val="tx1"/>
+                  </a:solidFill>
+                </a:rPr>
+                <a:t>I contain the business entities. I am at the center of everything.</a:t>
+              </a:r>
+              <a:endParaRPr lang="en-US" sz="1000" dirty="0">
+                <a:solidFill>
+                  <a:schemeClr val="tx1"/>
+                </a:solidFill>
+              </a:endParaRPr>
+            </a:p>
+          </p:txBody>
+        </p:sp>
+        <p:sp>
+          <p:nvSpPr>
+            <p:cNvPr id="36" name="Rounded Rectangular Callout 35"/>
+            <p:cNvSpPr/>
+            <p:nvPr/>
+          </p:nvSpPr>
+          <p:spPr>
+            <a:xfrm>
+              <a:off x="6882652" y="4786319"/>
+              <a:ext cx="1783015" cy="555172"/>
+            </a:xfrm>
+            <a:prstGeom prst="wedgeRoundRectCallout">
+              <a:avLst>
+                <a:gd name="adj1" fmla="val 61650"/>
+                <a:gd name="adj2" fmla="val -157108"/>
+                <a:gd name="adj3" fmla="val 16667"/>
+              </a:avLst>
+            </a:prstGeom>
+            <a:solidFill>
+              <a:schemeClr val="accent4">
+                <a:lumMod val="20000"/>
+                <a:lumOff val="80000"/>
+              </a:schemeClr>
+            </a:solidFill>
+          </p:spPr>
+          <p:style>
+            <a:lnRef idx="2">
+              <a:schemeClr val="accent1">
+                <a:shade val="50000"/>
+              </a:schemeClr>
+            </a:lnRef>
+            <a:fillRef idx="1">
+              <a:schemeClr val="accent1"/>
+            </a:fillRef>
+            <a:effectRef idx="0">
+              <a:schemeClr val="accent1"/>
+            </a:effectRef>
+            <a:fontRef idx="minor">
+              <a:schemeClr val="lt1"/>
+            </a:fontRef>
+          </p:style>
+          <p:txBody>
+            <a:bodyPr rtlCol="0" anchor="ctr"/>
+            <a:lstStyle/>
+            <a:p>
+              <a:pPr algn="ctr"/>
+              <a:r>
+                <a:rPr lang="en-US" sz="1000" dirty="0" smtClean="0">
+                  <a:solidFill>
+                    <a:schemeClr val="tx1"/>
+                  </a:solidFill>
+                </a:rPr>
+                <a:t>I provide the connection to the database and translate the code into SQL queries.</a:t>
+              </a:r>
+              <a:endParaRPr lang="en-US" sz="1000" dirty="0">
+                <a:solidFill>
+                  <a:schemeClr val="tx1"/>
+                </a:solidFill>
+              </a:endParaRPr>
+            </a:p>
+          </p:txBody>
+        </p:sp>
+      </p:grpSp>
+    </p:spTree>
+    <p:extLst>
+      <p:ext uri="{BB962C8B-B14F-4D97-AF65-F5344CB8AC3E}">
+        <p14:creationId xmlns:p14="http://schemas.microsoft.com/office/powerpoint/2010/main" val="91705766"/>
+      </p:ext>
+    </p:extLst>
+  </p:cSld>
+  <p:clrMapOvr>
+    <a:masterClrMapping/>
+  </p:clrMapOvr>
+  <p:timing>
+    <p:tnLst>
+      <p:par>
+        <p:cTn id="1" dur="indefinite" restart="never" nodeType="tmRoot"/>
+      </p:par>
+    </p:tnLst>
+  </p:timing>
+</p:sld>
+</file>
+
+<file path=ppt/slides/slide6.xml><?xml version="1.0" encoding="utf-8"?>
+<p:sld xmlns:a="http://schemas.openxmlformats.org/drawingml/2006/main" xmlns:r="http://schemas.openxmlformats.org/officeDocument/2006/relationships" xmlns:p="http://schemas.openxmlformats.org/presentationml/2006/main">
+  <p:cSld>
+    <p:spTree>
+      <p:nvGrpSpPr>
+        <p:cNvPr id="1" name=""/>
+        <p:cNvGrpSpPr/>
+        <p:nvPr/>
+      </p:nvGrpSpPr>
+      <p:grpSpPr>
+        <a:xfrm>
+          <a:off x="0" y="0"/>
+          <a:ext cx="0" cy="0"/>
+          <a:chOff x="0" y="0"/>
+          <a:chExt cx="0" cy="0"/>
+        </a:xfrm>
+      </p:grpSpPr>
+      <p:sp>
+        <p:nvSpPr>
           <p:cNvPr id="62" name="Rectangle 61"/>
           <p:cNvSpPr/>
           <p:nvPr/>
@@ -3986,7 +5389,7 @@
                   <a:schemeClr val="tx1"/>
                 </a:solidFill>
               </a:rPr>
-              <a:t>Providers</a:t>
+              <a:t>Domain</a:t>
             </a:r>
             <a:endParaRPr lang="en-US" sz="1200" dirty="0">
               <a:solidFill>
@@ -4381,14 +5784,7 @@
             <a:pPr algn="ctr"/>
             <a:r>
               <a:rPr lang="en-US" sz="1200" dirty="0" smtClean="0"/>
-              <a:t>JIRA </a:t>
-            </a:r>
-          </a:p>
-          <a:p>
-            <a:pPr algn="ctr"/>
-            <a:r>
-              <a:rPr lang="en-US" sz="1200" dirty="0" smtClean="0"/>
-              <a:t>Provider</a:t>
+              <a:t>Entities</a:t>
             </a:r>
             <a:endParaRPr lang="en-US" sz="1200" dirty="0"/>
           </a:p>
@@ -4818,97 +6214,6 @@
           </a:fontRef>
         </p:style>
       </p:cxnSp>
-      <p:sp>
-        <p:nvSpPr>
-          <p:cNvPr id="61" name="Rectangle 60"/>
-          <p:cNvSpPr/>
-          <p:nvPr/>
-        </p:nvSpPr>
-        <p:spPr>
-          <a:xfrm>
-            <a:off x="6852677" y="5425123"/>
-            <a:ext cx="1072123" cy="555171"/>
-          </a:xfrm>
-          <a:prstGeom prst="rect">
-            <a:avLst/>
-          </a:prstGeom>
-          <a:solidFill>
-            <a:schemeClr val="bg1">
-              <a:lumMod val="75000"/>
-            </a:schemeClr>
-          </a:solidFill>
-        </p:spPr>
-        <p:style>
-          <a:lnRef idx="2">
-            <a:schemeClr val="accent1"/>
-          </a:lnRef>
-          <a:fillRef idx="1">
-            <a:schemeClr val="lt1"/>
-          </a:fillRef>
-          <a:effectRef idx="0">
-            <a:schemeClr val="accent1"/>
-          </a:effectRef>
-          <a:fontRef idx="minor">
-            <a:schemeClr val="dk1"/>
-          </a:fontRef>
-        </p:style>
-        <p:txBody>
-          <a:bodyPr rtlCol="0" anchor="ctr"/>
-          <a:lstStyle/>
-          <a:p>
-            <a:pPr algn="ctr"/>
-            <a:r>
-              <a:rPr lang="en-US" sz="1200" dirty="0" smtClean="0">
-                <a:solidFill>
-                  <a:schemeClr val="tx1"/>
-                </a:solidFill>
-              </a:rPr>
-              <a:t>Jira API</a:t>
-            </a:r>
-            <a:endParaRPr lang="en-US" sz="1200" dirty="0">
-              <a:solidFill>
-                <a:schemeClr val="tx1"/>
-              </a:solidFill>
-            </a:endParaRPr>
-          </a:p>
-        </p:txBody>
-      </p:sp>
-      <p:cxnSp>
-        <p:nvCxnSpPr>
-          <p:cNvPr id="66" name="Straight Arrow Connector 65"/>
-          <p:cNvCxnSpPr>
-            <a:stCxn id="12" idx="3"/>
-            <a:endCxn id="61" idx="1"/>
-          </p:cNvCxnSpPr>
-          <p:nvPr/>
-        </p:nvCxnSpPr>
-        <p:spPr>
-          <a:xfrm flipV="1">
-            <a:off x="4770689" y="5702709"/>
-            <a:ext cx="2081988" cy="1"/>
-          </a:xfrm>
-          <a:prstGeom prst="straightConnector1">
-            <a:avLst/>
-          </a:prstGeom>
-          <a:ln>
-            <a:tailEnd type="triangle"/>
-          </a:ln>
-        </p:spPr>
-        <p:style>
-          <a:lnRef idx="1">
-            <a:schemeClr val="accent1"/>
-          </a:lnRef>
-          <a:fillRef idx="0">
-            <a:schemeClr val="accent1"/>
-          </a:fillRef>
-          <a:effectRef idx="0">
-            <a:schemeClr val="accent1"/>
-          </a:effectRef>
-          <a:fontRef idx="minor">
-            <a:schemeClr val="tx1"/>
-          </a:fontRef>
-        </p:style>
-      </p:cxnSp>
     </p:spTree>
     <p:extLst>
       <p:ext uri="{BB962C8B-B14F-4D97-AF65-F5344CB8AC3E}">
@@ -4929,7 +6234,7 @@
 </p:sld>
 </file>
 
-<file path=ppt/slides/slide5.xml><?xml version="1.0" encoding="utf-8"?>
+<file path=ppt/slides/slide7.xml><?xml version="1.0" encoding="utf-8"?>
 <p:sld xmlns:a="http://schemas.openxmlformats.org/drawingml/2006/main" xmlns:r="http://schemas.openxmlformats.org/officeDocument/2006/relationships" xmlns:p="http://schemas.openxmlformats.org/presentationml/2006/main">
   <p:cSld>
     <p:spTree>
@@ -6780,11 +8085,7 @@
                     <a:p>
                       <a:r>
                         <a:rPr lang="en-US" sz="1000" dirty="0" smtClean="0"/>
-                        <a:t>Name of the </a:t>
-                      </a:r>
-                      <a:r>
-                        <a:rPr lang="en-US" sz="1000" dirty="0" smtClean="0"/>
-                        <a:t>file</a:t>
+                        <a:t>Name of the file</a:t>
                       </a:r>
                       <a:endParaRPr lang="en-US" sz="1000" dirty="0"/>
                     </a:p>
@@ -7148,7 +8449,7 @@
 </p:sld>
 </file>
 
-<file path=ppt/slides/slide6.xml><?xml version="1.0" encoding="utf-8"?>
+<file path=ppt/slides/slide8.xml><?xml version="1.0" encoding="utf-8"?>
 <p:sld xmlns:a="http://schemas.openxmlformats.org/drawingml/2006/main" xmlns:r="http://schemas.openxmlformats.org/officeDocument/2006/relationships" xmlns:p="http://schemas.openxmlformats.org/presentationml/2006/main">
   <p:cSld>
     <p:spTree>
@@ -7250,11 +8551,7 @@
           <a:p>
             <a:r>
               <a:rPr lang="en-US" sz="3600" dirty="0" smtClean="0"/>
-              <a:t>High level </a:t>
-            </a:r>
-            <a:r>
-              <a:rPr lang="en-US" sz="3600" dirty="0" smtClean="0"/>
-              <a:t>design</a:t>
+              <a:t>High level design</a:t>
             </a:r>
             <a:endParaRPr lang="en-US" sz="3600" dirty="0"/>
           </a:p>
@@ -7520,7 +8817,7 @@
 </p:sld>
 </file>
 
-<file path=ppt/slides/slide7.xml><?xml version="1.0" encoding="utf-8"?>
+<file path=ppt/slides/slide9.xml><?xml version="1.0" encoding="utf-8"?>
 <p:sld xmlns:a="http://schemas.openxmlformats.org/drawingml/2006/main" xmlns:r="http://schemas.openxmlformats.org/officeDocument/2006/relationships" xmlns:p="http://schemas.openxmlformats.org/presentationml/2006/main">
   <p:cSld>
     <p:spTree>
@@ -7584,11 +8881,7 @@
           <a:p>
             <a:r>
               <a:rPr lang="en-US" sz="3600" dirty="0" smtClean="0"/>
-              <a:t>Building </a:t>
-            </a:r>
-            <a:r>
-              <a:rPr lang="en-US" sz="3600" dirty="0" smtClean="0"/>
-              <a:t>blocks</a:t>
+              <a:t>Building blocks</a:t>
             </a:r>
             <a:endParaRPr lang="en-US" sz="3600" dirty="0"/>
           </a:p>
@@ -7626,7 +8919,6 @@
               <a:rPr lang="en-US" sz="1600" dirty="0" smtClean="0"/>
               <a:t>a</a:t>
             </a:r>
-            <a:endParaRPr lang="en-US" sz="1600" dirty="0" smtClean="0"/>
           </a:p>
           <a:p>
             <a:endParaRPr lang="en-US" sz="1600" b="1" dirty="0" smtClean="0"/>
@@ -7640,14 +8932,12 @@
               <a:rPr lang="en-US" sz="1600" b="1" dirty="0" smtClean="0"/>
               <a:t>Asset Types</a:t>
             </a:r>
-            <a:endParaRPr lang="en-US" sz="1600" b="1" dirty="0" smtClean="0"/>
           </a:p>
           <a:p>
             <a:r>
               <a:rPr lang="en-US" sz="1600" dirty="0" smtClean="0"/>
               <a:t>a</a:t>
             </a:r>
-            <a:endParaRPr lang="en-US" sz="1600" dirty="0" smtClean="0"/>
           </a:p>
           <a:p>
             <a:endParaRPr lang="en-US" sz="1600" dirty="0" smtClean="0"/>
@@ -7661,7 +8951,6 @@
               <a:rPr lang="en-US" sz="1600" b="1" dirty="0" smtClean="0"/>
               <a:t>Assets</a:t>
             </a:r>
-            <a:endParaRPr lang="en-US" sz="1600" b="1" dirty="0" smtClean="0"/>
           </a:p>
           <a:p>
             <a:r>
@@ -7682,7 +8971,6 @@
               <a:rPr lang="en-US" sz="1600" b="1" dirty="0" smtClean="0"/>
               <a:t>Asset Files</a:t>
             </a:r>
-            <a:endParaRPr lang="en-US" sz="1600" b="1" dirty="0" smtClean="0"/>
           </a:p>
           <a:p>
             <a:r>
@@ -8009,12 +9297,9 @@
 </file>
 
 <file path=customXml/item1.xml><?xml version="1.0" encoding="utf-8"?>
-<?mso-contentType ?>
-<FormTemplates xmlns="http://schemas.microsoft.com/sharepoint/v3/contenttype/forms">
-  <Display>DocumentLibraryForm</Display>
-  <Edit>DocumentLibraryForm</Edit>
-  <New>DocumentLibraryForm</New>
-</FormTemplates>
+<p:properties xmlns:p="http://schemas.microsoft.com/office/2006/metadata/properties" xmlns:xsi="http://www.w3.org/2001/XMLSchema-instance" xmlns:pc="http://schemas.microsoft.com/office/infopath/2007/PartnerControls">
+  <documentManagement/>
+</p:properties>
 </file>
 
 <file path=customXml/item2.xml><?xml version="1.0" encoding="utf-8"?>
@@ -8190,15 +9475,19 @@
 </file>
 
 <file path=customXml/item3.xml><?xml version="1.0" encoding="utf-8"?>
-<p:properties xmlns:p="http://schemas.microsoft.com/office/2006/metadata/properties" xmlns:xsi="http://www.w3.org/2001/XMLSchema-instance" xmlns:pc="http://schemas.microsoft.com/office/infopath/2007/PartnerControls">
-  <documentManagement/>
-</p:properties>
+<?mso-contentType ?>
+<FormTemplates xmlns="http://schemas.microsoft.com/sharepoint/v3/contenttype/forms">
+  <Display>DocumentLibraryForm</Display>
+  <Edit>DocumentLibraryForm</Edit>
+  <New>DocumentLibraryForm</New>
+</FormTemplates>
 </file>
 
 <file path=customXml/itemProps1.xml><?xml version="1.0" encoding="utf-8"?>
-<ds:datastoreItem xmlns:ds="http://schemas.openxmlformats.org/officeDocument/2006/customXml" ds:itemID="{8CDB702E-3F50-4264-9CFC-35B79A02A69A}">
+<ds:datastoreItem xmlns:ds="http://schemas.openxmlformats.org/officeDocument/2006/customXml" ds:itemID="{2B86CB2E-7645-4F93-82AF-04EAF2AF8C03}">
   <ds:schemaRefs>
-    <ds:schemaRef ds:uri="http://schemas.microsoft.com/sharepoint/v3/contenttype/forms"/>
+    <ds:schemaRef ds:uri="http://schemas.microsoft.com/office/2006/metadata/properties"/>
+    <ds:schemaRef ds:uri="http://schemas.microsoft.com/office/infopath/2007/PartnerControls"/>
   </ds:schemaRefs>
 </ds:datastoreItem>
 </file>
@@ -8222,10 +9511,9 @@
 </file>
 
 <file path=customXml/itemProps3.xml><?xml version="1.0" encoding="utf-8"?>
-<ds:datastoreItem xmlns:ds="http://schemas.openxmlformats.org/officeDocument/2006/customXml" ds:itemID="{2B86CB2E-7645-4F93-82AF-04EAF2AF8C03}">
+<ds:datastoreItem xmlns:ds="http://schemas.openxmlformats.org/officeDocument/2006/customXml" ds:itemID="{8CDB702E-3F50-4264-9CFC-35B79A02A69A}">
   <ds:schemaRefs>
-    <ds:schemaRef ds:uri="http://schemas.microsoft.com/office/2006/metadata/properties"/>
-    <ds:schemaRef ds:uri="http://schemas.microsoft.com/office/infopath/2007/PartnerControls"/>
+    <ds:schemaRef ds:uri="http://schemas.microsoft.com/sharepoint/v3/contenttype/forms"/>
   </ds:schemaRefs>
 </ds:datastoreItem>
 </file>
</xml_diff>

<commit_message>
sql server dependencies added
</commit_message>
<xml_diff>
--- a/Design/Digital Asset - Design.pptx
+++ b/Design/Digital Asset - Design.pptx
@@ -4453,18 +4453,211 @@
           </a:p>
         </p:txBody>
       </p:sp>
+      <p:sp>
+        <p:nvSpPr>
+          <p:cNvPr id="14" name="TextBox 13"/>
+          <p:cNvSpPr txBox="1"/>
+          <p:nvPr/>
+        </p:nvSpPr>
+        <p:spPr>
+          <a:xfrm>
+            <a:off x="555171" y="1230086"/>
+            <a:ext cx="5817455" cy="4431983"/>
+          </a:xfrm>
+          <a:prstGeom prst="rect">
+            <a:avLst/>
+          </a:prstGeom>
+          <a:noFill/>
+        </p:spPr>
+        <p:txBody>
+          <a:bodyPr wrap="square" rtlCol="0">
+            <a:spAutoFit/>
+          </a:bodyPr>
+          <a:lstStyle/>
+          <a:p>
+            <a:r>
+              <a:rPr lang="en-US" sz="1600" b="1" dirty="0" smtClean="0"/>
+              <a:t>Clean architecture layers (Onion view)</a:t>
+            </a:r>
+          </a:p>
+          <a:p>
+            <a:r>
+              <a:rPr lang="en-US" sz="1400" dirty="0"/>
+              <a:t>Clean architecture puts the business logic and application model at the center of the application</a:t>
+            </a:r>
+            <a:r>
+              <a:rPr lang="en-US" sz="1400" dirty="0" smtClean="0"/>
+              <a:t>.</a:t>
+            </a:r>
+          </a:p>
+          <a:p>
+            <a:endParaRPr lang="en-US" sz="1400" dirty="0" smtClean="0"/>
+          </a:p>
+          <a:p>
+            <a:pPr marL="285750" indent="-285750">
+              <a:buFont typeface="Arial" panose="020B0604020202020204" pitchFamily="34" charset="0"/>
+              <a:buChar char="•"/>
+            </a:pPr>
+            <a:r>
+              <a:rPr lang="en-US" sz="1400" dirty="0" smtClean="0"/>
+              <a:t>Domain centric (domain entities), it has no </a:t>
+            </a:r>
+            <a:r>
+              <a:rPr lang="en-US" sz="1400" dirty="0" smtClean="0"/>
+              <a:t>dependencies on any layer.</a:t>
+            </a:r>
+            <a:endParaRPr lang="en-US" sz="1400" dirty="0" smtClean="0"/>
+          </a:p>
+          <a:p>
+            <a:pPr marL="285750" indent="-285750">
+              <a:buFont typeface="Arial" panose="020B0604020202020204" pitchFamily="34" charset="0"/>
+              <a:buChar char="•"/>
+            </a:pPr>
+            <a:r>
+              <a:rPr lang="en-US" sz="1400" dirty="0" smtClean="0"/>
+              <a:t>Application </a:t>
+            </a:r>
+            <a:r>
+              <a:rPr lang="en-US" sz="1400" dirty="0" smtClean="0"/>
+              <a:t>layer (business use cases) </a:t>
+            </a:r>
+            <a:r>
+              <a:rPr lang="en-US" sz="1400" dirty="0" smtClean="0"/>
+              <a:t>sits above the Domain layer. </a:t>
+            </a:r>
+            <a:endParaRPr lang="en-US" sz="1400" dirty="0" smtClean="0"/>
+          </a:p>
+          <a:p>
+            <a:pPr marL="742950" lvl="1" indent="-285750">
+              <a:buFont typeface="Arial" panose="020B0604020202020204" pitchFamily="34" charset="0"/>
+              <a:buChar char="•"/>
+            </a:pPr>
+            <a:r>
+              <a:rPr lang="en-US" sz="1400" dirty="0" smtClean="0"/>
+              <a:t>This </a:t>
+            </a:r>
+            <a:r>
+              <a:rPr lang="en-US" sz="1400" dirty="0" smtClean="0"/>
+              <a:t>layer contains all the business logic and it will have dependency on the Domain and </a:t>
+            </a:r>
+            <a:r>
+              <a:rPr lang="en-US" sz="1400" dirty="0" smtClean="0"/>
+              <a:t>Persistence</a:t>
+            </a:r>
+          </a:p>
+          <a:p>
+            <a:pPr marL="742950" lvl="1" indent="-285750">
+              <a:buFont typeface="Arial" panose="020B0604020202020204" pitchFamily="34" charset="0"/>
+              <a:buChar char="•"/>
+            </a:pPr>
+            <a:r>
+              <a:rPr lang="en-US" sz="1400" dirty="0" smtClean="0"/>
+              <a:t>Each use case will have separate classes</a:t>
+            </a:r>
+            <a:endParaRPr lang="en-US" sz="1400" dirty="0" smtClean="0"/>
+          </a:p>
+          <a:p>
+            <a:pPr marL="285750" indent="-285750">
+              <a:buFont typeface="Arial" panose="020B0604020202020204" pitchFamily="34" charset="0"/>
+              <a:buChar char="•"/>
+            </a:pPr>
+            <a:r>
+              <a:rPr lang="en-US" sz="1400" dirty="0" smtClean="0"/>
+              <a:t>API layer sits above the Application layer.</a:t>
+            </a:r>
+            <a:endParaRPr lang="en-US" sz="1400" dirty="0"/>
+          </a:p>
+          <a:p>
+            <a:pPr marL="285750" indent="-285750">
+              <a:buFont typeface="Arial" panose="020B0604020202020204" pitchFamily="34" charset="0"/>
+              <a:buChar char="•"/>
+            </a:pPr>
+            <a:r>
+              <a:rPr lang="en-US" sz="1400" dirty="0" smtClean="0"/>
+              <a:t>Persistence layer, will have dependency on the Domain (access to the entities</a:t>
+            </a:r>
+            <a:r>
+              <a:rPr lang="en-US" sz="1400" dirty="0" smtClean="0"/>
+              <a:t>)</a:t>
+            </a:r>
+          </a:p>
+          <a:p>
+            <a:pPr marL="285750" indent="-285750">
+              <a:buFont typeface="Arial" panose="020B0604020202020204" pitchFamily="34" charset="0"/>
+              <a:buChar char="•"/>
+            </a:pPr>
+            <a:endParaRPr lang="en-US" sz="1400" dirty="0"/>
+          </a:p>
+          <a:p>
+            <a:r>
+              <a:rPr lang="en-US" sz="1400" b="1" dirty="0" smtClean="0"/>
+              <a:t>Recommendations</a:t>
+            </a:r>
+          </a:p>
+          <a:p>
+            <a:pPr marL="285750" indent="-285750">
+              <a:buFont typeface="Arial" panose="020B0604020202020204" pitchFamily="34" charset="0"/>
+              <a:buChar char="•"/>
+            </a:pPr>
+            <a:r>
+              <a:rPr lang="en-US" sz="1400" dirty="0" smtClean="0"/>
+              <a:t>Independent from frameworks</a:t>
+            </a:r>
+          </a:p>
+          <a:p>
+            <a:pPr marL="285750" indent="-285750">
+              <a:buFont typeface="Arial" panose="020B0604020202020204" pitchFamily="34" charset="0"/>
+              <a:buChar char="•"/>
+            </a:pPr>
+            <a:r>
+              <a:rPr lang="en-US" sz="1400" dirty="0" smtClean="0"/>
+              <a:t>Testable</a:t>
+            </a:r>
+          </a:p>
+          <a:p>
+            <a:pPr marL="285750" indent="-285750">
+              <a:buFont typeface="Arial" panose="020B0604020202020204" pitchFamily="34" charset="0"/>
+              <a:buChar char="•"/>
+            </a:pPr>
+            <a:r>
+              <a:rPr lang="en-US" sz="1400" dirty="0" smtClean="0"/>
+              <a:t>Independent from the interface</a:t>
+            </a:r>
+          </a:p>
+          <a:p>
+            <a:pPr marL="285750" indent="-285750">
+              <a:buFont typeface="Arial" panose="020B0604020202020204" pitchFamily="34" charset="0"/>
+              <a:buChar char="•"/>
+            </a:pPr>
+            <a:r>
+              <a:rPr lang="en-US" sz="1400" dirty="0" smtClean="0"/>
+              <a:t>Independent from the database</a:t>
+            </a:r>
+          </a:p>
+          <a:p>
+            <a:endParaRPr lang="en-US" sz="1400" dirty="0" smtClean="0"/>
+          </a:p>
+          <a:p>
+            <a:pPr marL="285750" indent="-285750">
+              <a:buFont typeface="Arial" panose="020B0604020202020204" pitchFamily="34" charset="0"/>
+              <a:buChar char="•"/>
+            </a:pPr>
+            <a:endParaRPr lang="en-US" sz="1400" dirty="0"/>
+          </a:p>
+        </p:txBody>
+      </p:sp>
       <p:grpSp>
         <p:nvGrpSpPr>
-          <p:cNvPr id="15" name="Group 14"/>
+          <p:cNvPr id="22" name="Group 21"/>
           <p:cNvGrpSpPr/>
           <p:nvPr/>
         </p:nvGrpSpPr>
         <p:grpSpPr>
           <a:xfrm>
-            <a:off x="6578814" y="1983119"/>
-            <a:ext cx="5047129" cy="2698379"/>
-            <a:chOff x="6002510" y="1983119"/>
-            <a:chExt cx="5047129" cy="2698379"/>
+            <a:off x="8023412" y="1890059"/>
+            <a:ext cx="2841812" cy="2698379"/>
+            <a:chOff x="7740384" y="2096887"/>
+            <a:chExt cx="2841812" cy="2698379"/>
           </a:xfrm>
         </p:grpSpPr>
         <p:sp>
@@ -4475,7 +4668,7 @@
           </p:nvSpPr>
           <p:spPr>
             <a:xfrm>
-              <a:off x="6002510" y="1983119"/>
+              <a:off x="7740384" y="2096887"/>
               <a:ext cx="2841812" cy="2698379"/>
             </a:xfrm>
             <a:prstGeom prst="ellipse">
@@ -4518,7 +4711,7 @@
           </p:nvSpPr>
           <p:spPr>
             <a:xfrm>
-              <a:off x="6477639" y="2449285"/>
+              <a:off x="8215513" y="2563053"/>
               <a:ext cx="1864659" cy="1766047"/>
             </a:xfrm>
             <a:prstGeom prst="ellipse">
@@ -4562,7 +4755,7 @@
           </p:nvSpPr>
           <p:spPr>
             <a:xfrm>
-              <a:off x="6898981" y="2843733"/>
+              <a:off x="8636855" y="2957501"/>
               <a:ext cx="1013012" cy="959224"/>
             </a:xfrm>
             <a:prstGeom prst="ellipse">
@@ -4612,55 +4805,13 @@
         </p:sp>
         <p:sp>
           <p:nvSpPr>
-            <p:cNvPr id="5" name="Rounded Rectangle 4"/>
-            <p:cNvSpPr/>
-            <p:nvPr/>
-          </p:nvSpPr>
-          <p:spPr>
-            <a:xfrm>
-              <a:off x="9830439" y="3085780"/>
-              <a:ext cx="1219200" cy="475129"/>
-            </a:xfrm>
-            <a:prstGeom prst="roundRect">
-              <a:avLst/>
-            </a:prstGeom>
-          </p:spPr>
-          <p:style>
-            <a:lnRef idx="0">
-              <a:schemeClr val="accent1"/>
-            </a:lnRef>
-            <a:fillRef idx="3">
-              <a:schemeClr val="accent1"/>
-            </a:fillRef>
-            <a:effectRef idx="3">
-              <a:schemeClr val="accent1"/>
-            </a:effectRef>
-            <a:fontRef idx="minor">
-              <a:schemeClr val="lt1"/>
-            </a:fontRef>
-          </p:style>
-          <p:txBody>
-            <a:bodyPr rtlCol="0" anchor="ctr"/>
-            <a:lstStyle/>
-            <a:p>
-              <a:pPr algn="ctr"/>
-              <a:r>
-                <a:rPr lang="en-US" sz="1200" dirty="0" smtClean="0"/>
-                <a:t>Persistence</a:t>
-              </a:r>
-              <a:endParaRPr lang="en-US" sz="1200" dirty="0"/>
-            </a:p>
-          </p:txBody>
-        </p:sp>
-        <p:sp>
-          <p:nvSpPr>
             <p:cNvPr id="7" name="TextBox 6"/>
             <p:cNvSpPr txBox="1"/>
             <p:nvPr/>
           </p:nvSpPr>
           <p:spPr>
             <a:xfrm>
-              <a:off x="6978166" y="2508010"/>
+              <a:off x="8716040" y="2621778"/>
               <a:ext cx="890500" cy="276999"/>
             </a:xfrm>
             <a:prstGeom prst="rect">
@@ -4690,7 +4841,7 @@
           </p:nvSpPr>
           <p:spPr>
             <a:xfrm>
-              <a:off x="7208959" y="2073673"/>
+              <a:off x="8946833" y="2187441"/>
               <a:ext cx="393056" cy="276999"/>
             </a:xfrm>
             <a:prstGeom prst="rect">
@@ -4728,7 +4879,7 @@
           </p:nvSpPr>
           <p:spPr>
             <a:xfrm>
-              <a:off x="7330780" y="2758115"/>
+              <a:off x="9068654" y="2871883"/>
               <a:ext cx="149414" cy="182880"/>
             </a:xfrm>
             <a:prstGeom prst="downArrow">
@@ -4778,7 +4929,7 @@
           </p:nvSpPr>
           <p:spPr>
             <a:xfrm>
-              <a:off x="7330780" y="2323555"/>
+              <a:off x="9068654" y="2437323"/>
               <a:ext cx="149414" cy="182880"/>
             </a:xfrm>
             <a:prstGeom prst="downArrow">
@@ -4822,16 +4973,54 @@
         </p:sp>
         <p:sp>
           <p:nvSpPr>
-            <p:cNvPr id="12" name="Left Arrow 11"/>
+            <p:cNvPr id="17" name="TextBox 16"/>
+            <p:cNvSpPr txBox="1"/>
+            <p:nvPr/>
+          </p:nvSpPr>
+          <p:spPr>
+            <a:xfrm>
+              <a:off x="8697637" y="4408635"/>
+              <a:ext cx="1040862" cy="276999"/>
+            </a:xfrm>
+            <a:prstGeom prst="rect">
+              <a:avLst/>
+            </a:prstGeom>
+            <a:noFill/>
+          </p:spPr>
+          <p:txBody>
+            <a:bodyPr wrap="none" rtlCol="0">
+              <a:spAutoFit/>
+            </a:bodyPr>
+            <a:lstStyle/>
+            <a:p>
+              <a:r>
+                <a:rPr lang="en-US" sz="1200" dirty="0" smtClean="0">
+                  <a:solidFill>
+                    <a:schemeClr val="bg1"/>
+                  </a:solidFill>
+                </a:rPr>
+                <a:t>Infrastructure</a:t>
+              </a:r>
+              <a:endParaRPr lang="en-US" sz="1200" dirty="0">
+                <a:solidFill>
+                  <a:schemeClr val="bg1"/>
+                </a:solidFill>
+              </a:endParaRPr>
+            </a:p>
+          </p:txBody>
+        </p:sp>
+        <p:sp>
+          <p:nvSpPr>
+            <p:cNvPr id="18" name="Down Arrow 17"/>
             <p:cNvSpPr/>
             <p:nvPr/>
           </p:nvSpPr>
           <p:spPr>
-            <a:xfrm>
-              <a:off x="7777522" y="3157498"/>
-              <a:ext cx="1927412" cy="182880"/>
+            <a:xfrm rot="10800000">
+              <a:off x="9098095" y="4217770"/>
+              <a:ext cx="146304" cy="182880"/>
             </a:xfrm>
-            <a:prstGeom prst="leftArrow">
+            <a:prstGeom prst="downArrow">
               <a:avLst/>
             </a:prstGeom>
             <a:solidFill>
@@ -4870,250 +5059,83 @@
             </a:p>
           </p:txBody>
         </p:sp>
-        <p:sp>
-          <p:nvSpPr>
-            <p:cNvPr id="13" name="Right Arrow 12"/>
-            <p:cNvSpPr/>
+        <p:cxnSp>
+          <p:nvCxnSpPr>
+            <p:cNvPr id="19" name="Straight Connector 18"/>
+            <p:cNvCxnSpPr>
+              <a:stCxn id="6" idx="2"/>
+              <a:endCxn id="4" idx="2"/>
+            </p:cNvCxnSpPr>
             <p:nvPr/>
-          </p:nvSpPr>
+          </p:nvCxnSpPr>
           <p:spPr>
             <a:xfrm>
-              <a:off x="8118181" y="3392820"/>
-              <a:ext cx="1586753" cy="182880"/>
+              <a:off x="7740384" y="3446077"/>
+              <a:ext cx="475129" cy="0"/>
             </a:xfrm>
-            <a:prstGeom prst="rightArrow">
+            <a:prstGeom prst="line">
               <a:avLst/>
             </a:prstGeom>
-            <a:solidFill>
-              <a:srgbClr val="FFC000"/>
-            </a:solidFill>
-            <a:effectLst>
-              <a:outerShdw blurRad="50800" dist="38100" dir="2700000" algn="tl" rotWithShape="0">
-                <a:prstClr val="black">
-                  <a:alpha val="40000"/>
-                </a:prstClr>
-              </a:outerShdw>
-            </a:effectLst>
+            <a:ln w="50800">
+              <a:solidFill>
+                <a:schemeClr val="bg1"/>
+              </a:solidFill>
+            </a:ln>
           </p:spPr>
           <p:style>
-            <a:lnRef idx="2">
-              <a:schemeClr val="accent1">
-                <a:shade val="50000"/>
-              </a:schemeClr>
+            <a:lnRef idx="1">
+              <a:schemeClr val="accent1"/>
             </a:lnRef>
-            <a:fillRef idx="1">
+            <a:fillRef idx="0">
               <a:schemeClr val="accent1"/>
             </a:fillRef>
             <a:effectRef idx="0">
               <a:schemeClr val="accent1"/>
             </a:effectRef>
             <a:fontRef idx="minor">
-              <a:schemeClr val="lt1"/>
+              <a:schemeClr val="tx1"/>
             </a:fontRef>
           </p:style>
-          <p:txBody>
-            <a:bodyPr rtlCol="0" anchor="ctr"/>
-            <a:lstStyle/>
-            <a:p>
-              <a:pPr algn="ctr"/>
-              <a:endParaRPr lang="en-US"/>
-            </a:p>
-          </p:txBody>
-        </p:sp>
+        </p:cxnSp>
+        <p:cxnSp>
+          <p:nvCxnSpPr>
+            <p:cNvPr id="21" name="Straight Connector 20"/>
+            <p:cNvCxnSpPr>
+              <a:stCxn id="4" idx="6"/>
+              <a:endCxn id="6" idx="6"/>
+            </p:cNvCxnSpPr>
+            <p:nvPr/>
+          </p:nvCxnSpPr>
+          <p:spPr>
+            <a:xfrm>
+              <a:off x="10080172" y="3446077"/>
+              <a:ext cx="502024" cy="0"/>
+            </a:xfrm>
+            <a:prstGeom prst="line">
+              <a:avLst/>
+            </a:prstGeom>
+            <a:ln w="50800">
+              <a:solidFill>
+                <a:schemeClr val="bg1"/>
+              </a:solidFill>
+            </a:ln>
+          </p:spPr>
+          <p:style>
+            <a:lnRef idx="1">
+              <a:schemeClr val="accent1"/>
+            </a:lnRef>
+            <a:fillRef idx="0">
+              <a:schemeClr val="accent1"/>
+            </a:fillRef>
+            <a:effectRef idx="0">
+              <a:schemeClr val="accent1"/>
+            </a:effectRef>
+            <a:fontRef idx="minor">
+              <a:schemeClr val="tx1"/>
+            </a:fontRef>
+          </p:style>
+        </p:cxnSp>
       </p:grpSp>
-      <p:sp>
-        <p:nvSpPr>
-          <p:cNvPr id="14" name="TextBox 13"/>
-          <p:cNvSpPr txBox="1"/>
-          <p:nvPr/>
-        </p:nvSpPr>
-        <p:spPr>
-          <a:xfrm>
-            <a:off x="555171" y="1230086"/>
-            <a:ext cx="5817455" cy="4431983"/>
-          </a:xfrm>
-          <a:prstGeom prst="rect">
-            <a:avLst/>
-          </a:prstGeom>
-          <a:noFill/>
-        </p:spPr>
-        <p:txBody>
-          <a:bodyPr wrap="square" rtlCol="0">
-            <a:spAutoFit/>
-          </a:bodyPr>
-          <a:lstStyle/>
-          <a:p>
-            <a:r>
-              <a:rPr lang="en-US" sz="1600" b="1" dirty="0" smtClean="0"/>
-              <a:t>Clean architecture layers (Onion view)</a:t>
-            </a:r>
-          </a:p>
-          <a:p>
-            <a:r>
-              <a:rPr lang="en-US" sz="1400" dirty="0"/>
-              <a:t>Clean architecture puts the business logic and application model at the center of the application</a:t>
-            </a:r>
-            <a:r>
-              <a:rPr lang="en-US" sz="1400" dirty="0" smtClean="0"/>
-              <a:t>.</a:t>
-            </a:r>
-          </a:p>
-          <a:p>
-            <a:endParaRPr lang="en-US" sz="1400" dirty="0" smtClean="0"/>
-          </a:p>
-          <a:p>
-            <a:pPr marL="285750" indent="-285750">
-              <a:buFont typeface="Arial" panose="020B0604020202020204" pitchFamily="34" charset="0"/>
-              <a:buChar char="•"/>
-            </a:pPr>
-            <a:r>
-              <a:rPr lang="en-US" sz="1400" dirty="0" smtClean="0"/>
-              <a:t>Domain centric (domain entities), it has no </a:t>
-            </a:r>
-            <a:r>
-              <a:rPr lang="en-US" sz="1400" dirty="0" smtClean="0"/>
-              <a:t>dependencies on any layer.</a:t>
-            </a:r>
-            <a:endParaRPr lang="en-US" sz="1400" dirty="0" smtClean="0"/>
-          </a:p>
-          <a:p>
-            <a:pPr marL="285750" indent="-285750">
-              <a:buFont typeface="Arial" panose="020B0604020202020204" pitchFamily="34" charset="0"/>
-              <a:buChar char="•"/>
-            </a:pPr>
-            <a:r>
-              <a:rPr lang="en-US" sz="1400" dirty="0" smtClean="0"/>
-              <a:t>Application </a:t>
-            </a:r>
-            <a:r>
-              <a:rPr lang="en-US" sz="1400" dirty="0" smtClean="0"/>
-              <a:t>layer (business use cases) </a:t>
-            </a:r>
-            <a:r>
-              <a:rPr lang="en-US" sz="1400" dirty="0" smtClean="0"/>
-              <a:t>sits above the Domain layer. </a:t>
-            </a:r>
-            <a:endParaRPr lang="en-US" sz="1400" dirty="0" smtClean="0"/>
-          </a:p>
-          <a:p>
-            <a:pPr marL="742950" lvl="1" indent="-285750">
-              <a:buFont typeface="Arial" panose="020B0604020202020204" pitchFamily="34" charset="0"/>
-              <a:buChar char="•"/>
-            </a:pPr>
-            <a:r>
-              <a:rPr lang="en-US" sz="1400" dirty="0" smtClean="0"/>
-              <a:t>This </a:t>
-            </a:r>
-            <a:r>
-              <a:rPr lang="en-US" sz="1400" dirty="0" smtClean="0"/>
-              <a:t>layer contains all the business logic and it will have dependency on the Domain and </a:t>
-            </a:r>
-            <a:r>
-              <a:rPr lang="en-US" sz="1400" dirty="0" smtClean="0"/>
-              <a:t>Persistence</a:t>
-            </a:r>
-          </a:p>
-          <a:p>
-            <a:pPr marL="742950" lvl="1" indent="-285750">
-              <a:buFont typeface="Arial" panose="020B0604020202020204" pitchFamily="34" charset="0"/>
-              <a:buChar char="•"/>
-            </a:pPr>
-            <a:r>
-              <a:rPr lang="en-US" sz="1400" dirty="0" smtClean="0"/>
-              <a:t>Each use case will have separate classes</a:t>
-            </a:r>
-            <a:endParaRPr lang="en-US" sz="1400" dirty="0" smtClean="0"/>
-          </a:p>
-          <a:p>
-            <a:pPr marL="285750" indent="-285750">
-              <a:buFont typeface="Arial" panose="020B0604020202020204" pitchFamily="34" charset="0"/>
-              <a:buChar char="•"/>
-            </a:pPr>
-            <a:r>
-              <a:rPr lang="en-US" sz="1400" dirty="0" smtClean="0"/>
-              <a:t>API layer sits above the Application layer.</a:t>
-            </a:r>
-            <a:endParaRPr lang="en-US" sz="1400" dirty="0"/>
-          </a:p>
-          <a:p>
-            <a:pPr marL="285750" indent="-285750">
-              <a:buFont typeface="Arial" panose="020B0604020202020204" pitchFamily="34" charset="0"/>
-              <a:buChar char="•"/>
-            </a:pPr>
-            <a:r>
-              <a:rPr lang="en-US" sz="1400" dirty="0" smtClean="0"/>
-              <a:t>Persistence layer, will have dependency on the Domain (access to the entities</a:t>
-            </a:r>
-            <a:r>
-              <a:rPr lang="en-US" sz="1400" dirty="0" smtClean="0"/>
-              <a:t>)</a:t>
-            </a:r>
-          </a:p>
-          <a:p>
-            <a:pPr marL="285750" indent="-285750">
-              <a:buFont typeface="Arial" panose="020B0604020202020204" pitchFamily="34" charset="0"/>
-              <a:buChar char="•"/>
-            </a:pPr>
-            <a:endParaRPr lang="en-US" sz="1400" dirty="0"/>
-          </a:p>
-          <a:p>
-            <a:r>
-              <a:rPr lang="en-US" sz="1400" b="1" dirty="0" smtClean="0"/>
-              <a:t>Recommendations</a:t>
-            </a:r>
-          </a:p>
-          <a:p>
-            <a:pPr marL="285750" indent="-285750">
-              <a:buFont typeface="Arial" panose="020B0604020202020204" pitchFamily="34" charset="0"/>
-              <a:buChar char="•"/>
-            </a:pPr>
-            <a:r>
-              <a:rPr lang="en-US" sz="1400" dirty="0" smtClean="0"/>
-              <a:t>Independent from frameworks</a:t>
-            </a:r>
-          </a:p>
-          <a:p>
-            <a:pPr marL="285750" indent="-285750">
-              <a:buFont typeface="Arial" panose="020B0604020202020204" pitchFamily="34" charset="0"/>
-              <a:buChar char="•"/>
-            </a:pPr>
-            <a:r>
-              <a:rPr lang="en-US" sz="1400" dirty="0" smtClean="0"/>
-              <a:t>Testable</a:t>
-            </a:r>
-          </a:p>
-          <a:p>
-            <a:pPr marL="285750" indent="-285750">
-              <a:buFont typeface="Arial" panose="020B0604020202020204" pitchFamily="34" charset="0"/>
-              <a:buChar char="•"/>
-            </a:pPr>
-            <a:r>
-              <a:rPr lang="en-US" sz="1400" dirty="0" smtClean="0"/>
-              <a:t>Independent from the interface</a:t>
-            </a:r>
-          </a:p>
-          <a:p>
-            <a:pPr marL="285750" indent="-285750">
-              <a:buFont typeface="Arial" panose="020B0604020202020204" pitchFamily="34" charset="0"/>
-              <a:buChar char="•"/>
-            </a:pPr>
-            <a:r>
-              <a:rPr lang="en-US" sz="1400" dirty="0" smtClean="0"/>
-              <a:t>Independent from the database</a:t>
-            </a:r>
-          </a:p>
-          <a:p>
-            <a:endParaRPr lang="en-US" sz="1400" dirty="0" smtClean="0"/>
-          </a:p>
-          <a:p>
-            <a:pPr marL="285750" indent="-285750">
-              <a:buFont typeface="Arial" panose="020B0604020202020204" pitchFamily="34" charset="0"/>
-              <a:buChar char="•"/>
-            </a:pPr>
-            <a:endParaRPr lang="en-US" sz="1400" dirty="0"/>
-          </a:p>
-        </p:txBody>
-      </p:sp>
     </p:spTree>
     <p:extLst>
       <p:ext uri="{BB962C8B-B14F-4D97-AF65-F5344CB8AC3E}">

</xml_diff>

<commit_message>
models, context and sql configurations added
</commit_message>
<xml_diff>
--- a/Design/Digital Asset - Design.pptx
+++ b/Design/Digital Asset - Design.pptx
@@ -16,6 +16,7 @@
     <p:sldId id="8338" r:id="rId13"/>
     <p:sldId id="8344" r:id="rId14"/>
     <p:sldId id="8345" r:id="rId15"/>
+    <p:sldId id="8350" r:id="rId16"/>
   </p:sldIdLst>
   <p:sldSz cx="12192000" cy="6858000"/>
   <p:notesSz cx="6858000" cy="9144000"/>
@@ -3943,6 +3944,194 @@
           <a:p>
             <a:r>
               <a:rPr lang="en-US" sz="3600" dirty="0" smtClean="0"/>
+              <a:t>Entity framework</a:t>
+            </a:r>
+            <a:endParaRPr lang="en-US" sz="3600" dirty="0"/>
+          </a:p>
+        </p:txBody>
+      </p:sp>
+      <p:sp>
+        <p:nvSpPr>
+          <p:cNvPr id="2" name="TextBox 1">
+            <a:extLst>
+              <a:ext uri="{FF2B5EF4-FFF2-40B4-BE49-F238E27FC236}">
+                <a16:creationId xmlns:a16="http://schemas.microsoft.com/office/drawing/2014/main" id="{8726C6FA-44FA-4E6F-8D8E-4F457920CF7B}"/>
+              </a:ext>
+            </a:extLst>
+          </p:cNvPr>
+          <p:cNvSpPr txBox="1"/>
+          <p:nvPr/>
+        </p:nvSpPr>
+        <p:spPr>
+          <a:xfrm>
+            <a:off x="555171" y="1390979"/>
+            <a:ext cx="11070772" cy="1384995"/>
+          </a:xfrm>
+          <a:prstGeom prst="rect">
+            <a:avLst/>
+          </a:prstGeom>
+          <a:noFill/>
+        </p:spPr>
+        <p:txBody>
+          <a:bodyPr wrap="square" rtlCol="0">
+            <a:spAutoFit/>
+          </a:bodyPr>
+          <a:lstStyle/>
+          <a:p>
+            <a:r>
+              <a:rPr lang="en-US" sz="1400" b="1" dirty="0" smtClean="0"/>
+              <a:t>Generate models and context</a:t>
+            </a:r>
+          </a:p>
+          <a:p>
+            <a:endParaRPr lang="en-US" sz="1400" dirty="0" smtClean="0"/>
+          </a:p>
+          <a:p>
+            <a:r>
+              <a:rPr lang="en-US" sz="1400" dirty="0" smtClean="0"/>
+              <a:t>Scaffold-</a:t>
+            </a:r>
+            <a:r>
+              <a:rPr lang="en-US" sz="1400" dirty="0" err="1" smtClean="0"/>
+              <a:t>DbContext</a:t>
+            </a:r>
+            <a:r>
+              <a:rPr lang="en-US" sz="1400" dirty="0" smtClean="0"/>
+              <a:t> </a:t>
+            </a:r>
+            <a:r>
+              <a:rPr lang="en-US" sz="1400" dirty="0"/>
+              <a:t>"Server=</a:t>
+            </a:r>
+            <a:r>
+              <a:rPr lang="en-US" sz="1400" dirty="0" err="1"/>
+              <a:t>localhost;Database</a:t>
+            </a:r>
+            <a:r>
+              <a:rPr lang="en-US" sz="1400" dirty="0"/>
+              <a:t>=</a:t>
+            </a:r>
+            <a:r>
+              <a:rPr lang="en-US" sz="1400" dirty="0" err="1"/>
+              <a:t>DigitalAssets;Trusted_Connection</a:t>
+            </a:r>
+            <a:r>
+              <a:rPr lang="en-US" sz="1400" dirty="0"/>
+              <a:t>=True;" </a:t>
+            </a:r>
+            <a:r>
+              <a:rPr lang="en-US" sz="1400" dirty="0" err="1"/>
+              <a:t>Microsoft.EntityFrameworkCore.SqlServer</a:t>
+            </a:r>
+            <a:r>
+              <a:rPr lang="en-US" sz="1400" dirty="0"/>
+              <a:t> -</a:t>
+            </a:r>
+            <a:r>
+              <a:rPr lang="en-US" sz="1400" dirty="0" err="1"/>
+              <a:t>OutputDir</a:t>
+            </a:r>
+            <a:r>
+              <a:rPr lang="en-US" sz="1400" dirty="0"/>
+              <a:t> </a:t>
+            </a:r>
+            <a:r>
+              <a:rPr lang="en-US" sz="1400" dirty="0" smtClean="0"/>
+              <a:t>Models</a:t>
+            </a:r>
+          </a:p>
+          <a:p>
+            <a:endParaRPr lang="en-US" sz="1400" smtClean="0"/>
+          </a:p>
+          <a:p>
+            <a:endParaRPr lang="en-US" sz="1400" dirty="0"/>
+          </a:p>
+        </p:txBody>
+      </p:sp>
+    </p:spTree>
+    <p:extLst>
+      <p:ext uri="{BB962C8B-B14F-4D97-AF65-F5344CB8AC3E}">
+        <p14:creationId xmlns:p14="http://schemas.microsoft.com/office/powerpoint/2010/main" val="87195330"/>
+      </p:ext>
+    </p:extLst>
+  </p:cSld>
+  <p:clrMapOvr>
+    <a:masterClrMapping/>
+  </p:clrMapOvr>
+  <p:timing>
+    <p:tnLst>
+      <p:par>
+        <p:cTn id="1" dur="indefinite" restart="never" nodeType="tmRoot"/>
+      </p:par>
+    </p:tnLst>
+  </p:timing>
+</p:sld>
+</file>
+
+<file path=ppt/slides/slide12.xml><?xml version="1.0" encoding="utf-8"?>
+<p:sld xmlns:a="http://schemas.openxmlformats.org/drawingml/2006/main" xmlns:r="http://schemas.openxmlformats.org/officeDocument/2006/relationships" xmlns:p="http://schemas.openxmlformats.org/presentationml/2006/main">
+  <p:cSld>
+    <p:spTree>
+      <p:nvGrpSpPr>
+        <p:cNvPr id="1" name=""/>
+        <p:cNvGrpSpPr/>
+        <p:nvPr/>
+      </p:nvGrpSpPr>
+      <p:grpSpPr>
+        <a:xfrm>
+          <a:off x="0" y="0"/>
+          <a:ext cx="0" cy="0"/>
+          <a:chOff x="0" y="0"/>
+          <a:chExt cx="0" cy="0"/>
+        </a:xfrm>
+      </p:grpSpPr>
+      <p:sp>
+        <p:nvSpPr>
+          <p:cNvPr id="109" name="Title 1">
+            <a:extLst>
+              <a:ext uri="{FF2B5EF4-FFF2-40B4-BE49-F238E27FC236}">
+                <a16:creationId xmlns:a16="http://schemas.microsoft.com/office/drawing/2014/main" id="{78C07964-174A-4A54-84D3-E88913B49D0E}"/>
+              </a:ext>
+            </a:extLst>
+          </p:cNvPr>
+          <p:cNvSpPr txBox="1">
+            <a:spLocks/>
+          </p:cNvSpPr>
+          <p:nvPr/>
+        </p:nvSpPr>
+        <p:spPr>
+          <a:xfrm>
+            <a:off x="555171" y="-4998"/>
+            <a:ext cx="11070772" cy="1039142"/>
+          </a:xfrm>
+          <a:prstGeom prst="rect">
+            <a:avLst/>
+          </a:prstGeom>
+        </p:spPr>
+        <p:txBody>
+          <a:bodyPr anchor="ctr"/>
+          <a:lstStyle>
+            <a:lvl1pPr algn="l" defTabSz="914400" rtl="0" eaLnBrk="1" latinLnBrk="0" hangingPunct="1">
+              <a:lnSpc>
+                <a:spcPct val="90000"/>
+              </a:lnSpc>
+              <a:spcBef>
+                <a:spcPct val="0"/>
+              </a:spcBef>
+              <a:buNone/>
+              <a:defRPr sz="4400" kern="1200">
+                <a:solidFill>
+                  <a:schemeClr val="tx1"/>
+                </a:solidFill>
+                <a:latin typeface="+mj-lt"/>
+                <a:ea typeface="+mj-ea"/>
+                <a:cs typeface="+mj-cs"/>
+              </a:defRPr>
+            </a:lvl1pPr>
+          </a:lstStyle>
+          <a:p>
+            <a:r>
+              <a:rPr lang="en-US" sz="3600" dirty="0" smtClean="0"/>
               <a:t>Building blocks</a:t>
             </a:r>
             <a:endParaRPr lang="en-US" sz="3600" dirty="0"/>
@@ -4046,7 +4235,7 @@
     </p:spTree>
     <p:extLst>
       <p:ext uri="{BB962C8B-B14F-4D97-AF65-F5344CB8AC3E}">
-        <p14:creationId xmlns:p14="http://schemas.microsoft.com/office/powerpoint/2010/main" val="87195330"/>
+        <p14:creationId xmlns:p14="http://schemas.microsoft.com/office/powerpoint/2010/main" val="4052666979"/>
       </p:ext>
     </p:extLst>
   </p:cSld>
@@ -4500,13 +4689,8 @@
             </a:pPr>
             <a:r>
               <a:rPr lang="en-US" sz="1400" dirty="0" smtClean="0"/>
-              <a:t>Domain centric (domain entities), it has no </a:t>
-            </a:r>
-            <a:r>
-              <a:rPr lang="en-US" sz="1400" dirty="0" smtClean="0"/>
-              <a:t>dependencies on any layer.</a:t>
-            </a:r>
-            <a:endParaRPr lang="en-US" sz="1400" dirty="0" smtClean="0"/>
+              <a:t>Domain centric (domain entities), it has no dependencies on any layer.</a:t>
+            </a:r>
           </a:p>
           <a:p>
             <a:pPr marL="285750" indent="-285750">
@@ -4515,17 +4699,8 @@
             </a:pPr>
             <a:r>
               <a:rPr lang="en-US" sz="1400" dirty="0" smtClean="0"/>
-              <a:t>Application </a:t>
-            </a:r>
-            <a:r>
-              <a:rPr lang="en-US" sz="1400" dirty="0" smtClean="0"/>
-              <a:t>layer (business use cases) </a:t>
-            </a:r>
-            <a:r>
-              <a:rPr lang="en-US" sz="1400" dirty="0" smtClean="0"/>
-              <a:t>sits above the Domain layer. </a:t>
-            </a:r>
-            <a:endParaRPr lang="en-US" sz="1400" dirty="0" smtClean="0"/>
+              <a:t>Application layer (business use cases) sits above the Domain layer. </a:t>
+            </a:r>
           </a:p>
           <a:p>
             <a:pPr marL="742950" lvl="1" indent="-285750">
@@ -4534,15 +4709,7 @@
             </a:pPr>
             <a:r>
               <a:rPr lang="en-US" sz="1400" dirty="0" smtClean="0"/>
-              <a:t>This </a:t>
-            </a:r>
-            <a:r>
-              <a:rPr lang="en-US" sz="1400" dirty="0" smtClean="0"/>
-              <a:t>layer contains all the business logic and it will have dependency on the Domain and </a:t>
-            </a:r>
-            <a:r>
-              <a:rPr lang="en-US" sz="1400" dirty="0" smtClean="0"/>
-              <a:t>Persistence</a:t>
+              <a:t>This layer contains all the business logic and it will have dependency on the Domain and Persistence</a:t>
             </a:r>
           </a:p>
           <a:p>
@@ -4554,7 +4721,6 @@
               <a:rPr lang="en-US" sz="1400" dirty="0" smtClean="0"/>
               <a:t>Each use case will have separate classes</a:t>
             </a:r>
-            <a:endParaRPr lang="en-US" sz="1400" dirty="0" smtClean="0"/>
           </a:p>
           <a:p>
             <a:pPr marL="285750" indent="-285750">
@@ -4574,11 +4740,7 @@
             </a:pPr>
             <a:r>
               <a:rPr lang="en-US" sz="1400" dirty="0" smtClean="0"/>
-              <a:t>Persistence layer, will have dependency on the Domain (access to the entities</a:t>
-            </a:r>
-            <a:r>
-              <a:rPr lang="en-US" sz="1400" dirty="0" smtClean="0"/>
-              <a:t>)</a:t>
+              <a:t>Persistence layer, will have dependency on the Domain (access to the entities)</a:t>
             </a:r>
           </a:p>
           <a:p>
@@ -11994,12 +12156,9 @@
 </file>
 
 <file path=customXml/item1.xml><?xml version="1.0" encoding="utf-8"?>
-<?mso-contentType ?>
-<FormTemplates xmlns="http://schemas.microsoft.com/sharepoint/v3/contenttype/forms">
-  <Display>DocumentLibraryForm</Display>
-  <Edit>DocumentLibraryForm</Edit>
-  <New>DocumentLibraryForm</New>
-</FormTemplates>
+<p:properties xmlns:p="http://schemas.microsoft.com/office/2006/metadata/properties" xmlns:xsi="http://www.w3.org/2001/XMLSchema-instance" xmlns:pc="http://schemas.microsoft.com/office/infopath/2007/PartnerControls">
+  <documentManagement/>
+</p:properties>
 </file>
 
 <file path=customXml/item2.xml><?xml version="1.0" encoding="utf-8"?>
@@ -12175,15 +12334,19 @@
 </file>
 
 <file path=customXml/item3.xml><?xml version="1.0" encoding="utf-8"?>
-<p:properties xmlns:p="http://schemas.microsoft.com/office/2006/metadata/properties" xmlns:xsi="http://www.w3.org/2001/XMLSchema-instance" xmlns:pc="http://schemas.microsoft.com/office/infopath/2007/PartnerControls">
-  <documentManagement/>
-</p:properties>
+<?mso-contentType ?>
+<FormTemplates xmlns="http://schemas.microsoft.com/sharepoint/v3/contenttype/forms">
+  <Display>DocumentLibraryForm</Display>
+  <Edit>DocumentLibraryForm</Edit>
+  <New>DocumentLibraryForm</New>
+</FormTemplates>
 </file>
 
 <file path=customXml/itemProps1.xml><?xml version="1.0" encoding="utf-8"?>
-<ds:datastoreItem xmlns:ds="http://schemas.openxmlformats.org/officeDocument/2006/customXml" ds:itemID="{8CDB702E-3F50-4264-9CFC-35B79A02A69A}">
+<ds:datastoreItem xmlns:ds="http://schemas.openxmlformats.org/officeDocument/2006/customXml" ds:itemID="{2B86CB2E-7645-4F93-82AF-04EAF2AF8C03}">
   <ds:schemaRefs>
-    <ds:schemaRef ds:uri="http://schemas.microsoft.com/sharepoint/v3/contenttype/forms"/>
+    <ds:schemaRef ds:uri="http://schemas.microsoft.com/office/2006/metadata/properties"/>
+    <ds:schemaRef ds:uri="http://schemas.microsoft.com/office/infopath/2007/PartnerControls"/>
   </ds:schemaRefs>
 </ds:datastoreItem>
 </file>
@@ -12207,10 +12370,9 @@
 </file>
 
 <file path=customXml/itemProps3.xml><?xml version="1.0" encoding="utf-8"?>
-<ds:datastoreItem xmlns:ds="http://schemas.openxmlformats.org/officeDocument/2006/customXml" ds:itemID="{2B86CB2E-7645-4F93-82AF-04EAF2AF8C03}">
+<ds:datastoreItem xmlns:ds="http://schemas.openxmlformats.org/officeDocument/2006/customXml" ds:itemID="{8CDB702E-3F50-4264-9CFC-35B79A02A69A}">
   <ds:schemaRefs>
-    <ds:schemaRef ds:uri="http://schemas.microsoft.com/office/2006/metadata/properties"/>
-    <ds:schemaRef ds:uri="http://schemas.microsoft.com/office/infopath/2007/PartnerControls"/>
+    <ds:schemaRef ds:uri="http://schemas.microsoft.com/sharepoint/v3/contenttype/forms"/>
   </ds:schemaRefs>
 </ds:datastoreItem>
 </file>
</xml_diff>

<commit_message>
triggers to update master search
</commit_message>
<xml_diff>
--- a/Design/Digital Asset - Design.pptx
+++ b/Design/Digital Asset - Design.pptx
@@ -273,7 +273,7 @@
           <a:p>
             <a:fld id="{8FBEF592-9A5F-4028-BE74-EE215189E296}" type="datetimeFigureOut">
               <a:rPr lang="en-US" smtClean="0"/>
-              <a:t>7/13/2021</a:t>
+              <a:t>8/8/2021</a:t>
             </a:fld>
             <a:endParaRPr lang="en-US"/>
           </a:p>
@@ -471,7 +471,7 @@
           <a:p>
             <a:fld id="{8FBEF592-9A5F-4028-BE74-EE215189E296}" type="datetimeFigureOut">
               <a:rPr lang="en-US" smtClean="0"/>
-              <a:t>7/13/2021</a:t>
+              <a:t>8/8/2021</a:t>
             </a:fld>
             <a:endParaRPr lang="en-US"/>
           </a:p>
@@ -679,7 +679,7 @@
           <a:p>
             <a:fld id="{8FBEF592-9A5F-4028-BE74-EE215189E296}" type="datetimeFigureOut">
               <a:rPr lang="en-US" smtClean="0"/>
-              <a:t>7/13/2021</a:t>
+              <a:t>8/8/2021</a:t>
             </a:fld>
             <a:endParaRPr lang="en-US"/>
           </a:p>
@@ -792,7 +792,7 @@
           <a:p>
             <a:fld id="{708BE3AE-D757-42E3-9D32-22A977FECB4E}" type="datetime4">
               <a:rPr lang="en-US" smtClean="0"/>
-              <a:t>July 13, 2021</a:t>
+              <a:t>August 8, 2021</a:t>
             </a:fld>
             <a:endParaRPr lang="en-US" dirty="0"/>
           </a:p>
@@ -994,7 +994,7 @@
           <a:p>
             <a:fld id="{8FBEF592-9A5F-4028-BE74-EE215189E296}" type="datetimeFigureOut">
               <a:rPr lang="en-US" smtClean="0"/>
-              <a:t>7/13/2021</a:t>
+              <a:t>8/8/2021</a:t>
             </a:fld>
             <a:endParaRPr lang="en-US"/>
           </a:p>
@@ -1269,7 +1269,7 @@
           <a:p>
             <a:fld id="{8FBEF592-9A5F-4028-BE74-EE215189E296}" type="datetimeFigureOut">
               <a:rPr lang="en-US" smtClean="0"/>
-              <a:t>7/13/2021</a:t>
+              <a:t>8/8/2021</a:t>
             </a:fld>
             <a:endParaRPr lang="en-US"/>
           </a:p>
@@ -1534,7 +1534,7 @@
           <a:p>
             <a:fld id="{8FBEF592-9A5F-4028-BE74-EE215189E296}" type="datetimeFigureOut">
               <a:rPr lang="en-US" smtClean="0"/>
-              <a:t>7/13/2021</a:t>
+              <a:t>8/8/2021</a:t>
             </a:fld>
             <a:endParaRPr lang="en-US"/>
           </a:p>
@@ -1946,7 +1946,7 @@
           <a:p>
             <a:fld id="{8FBEF592-9A5F-4028-BE74-EE215189E296}" type="datetimeFigureOut">
               <a:rPr lang="en-US" smtClean="0"/>
-              <a:t>7/13/2021</a:t>
+              <a:t>8/8/2021</a:t>
             </a:fld>
             <a:endParaRPr lang="en-US"/>
           </a:p>
@@ -2087,7 +2087,7 @@
           <a:p>
             <a:fld id="{8FBEF592-9A5F-4028-BE74-EE215189E296}" type="datetimeFigureOut">
               <a:rPr lang="en-US" smtClean="0"/>
-              <a:t>7/13/2021</a:t>
+              <a:t>8/8/2021</a:t>
             </a:fld>
             <a:endParaRPr lang="en-US"/>
           </a:p>
@@ -2200,7 +2200,7 @@
           <a:p>
             <a:fld id="{8FBEF592-9A5F-4028-BE74-EE215189E296}" type="datetimeFigureOut">
               <a:rPr lang="en-US" smtClean="0"/>
-              <a:t>7/13/2021</a:t>
+              <a:t>8/8/2021</a:t>
             </a:fld>
             <a:endParaRPr lang="en-US"/>
           </a:p>
@@ -2511,7 +2511,7 @@
           <a:p>
             <a:fld id="{8FBEF592-9A5F-4028-BE74-EE215189E296}" type="datetimeFigureOut">
               <a:rPr lang="en-US" smtClean="0"/>
-              <a:t>7/13/2021</a:t>
+              <a:t>8/8/2021</a:t>
             </a:fld>
             <a:endParaRPr lang="en-US"/>
           </a:p>
@@ -2799,7 +2799,7 @@
           <a:p>
             <a:fld id="{8FBEF592-9A5F-4028-BE74-EE215189E296}" type="datetimeFigureOut">
               <a:rPr lang="en-US" smtClean="0"/>
-              <a:t>7/13/2021</a:t>
+              <a:t>8/8/2021</a:t>
             </a:fld>
             <a:endParaRPr lang="en-US"/>
           </a:p>
@@ -3040,7 +3040,7 @@
           <a:p>
             <a:fld id="{8FBEF592-9A5F-4028-BE74-EE215189E296}" type="datetimeFigureOut">
               <a:rPr lang="en-US" smtClean="0"/>
-              <a:t>7/13/2021</a:t>
+              <a:t>8/8/2021</a:t>
             </a:fld>
             <a:endParaRPr lang="en-US"/>
           </a:p>
@@ -3488,8 +3488,8 @@
           <a:p>
             <a:pPr algn="ctr"/>
             <a:r>
-              <a:rPr lang="en-US" sz="4000" b="1" dirty="0" err="1" smtClean="0"/>
-              <a:t>eAssets</a:t>
+              <a:rPr lang="en-US" sz="4000" b="1" dirty="0" smtClean="0"/>
+              <a:t>assets</a:t>
             </a:r>
             <a:endParaRPr lang="en-US" sz="4000" dirty="0"/>
           </a:p>
@@ -4912,11 +4912,7 @@
                     <a:p>
                       <a:r>
                         <a:rPr lang="en-US" sz="1000" dirty="0" smtClean="0"/>
-                        <a:t>Unique </a:t>
-                      </a:r>
-                      <a:r>
-                        <a:rPr lang="en-US" sz="1000" dirty="0" smtClean="0"/>
-                        <a:t>Identifier</a:t>
+                        <a:t>Unique Identifier</a:t>
                       </a:r>
                       <a:endParaRPr lang="en-US" sz="1000" dirty="0"/>
                     </a:p>
@@ -8349,15 +8345,7 @@
             </a:r>
             <a:r>
               <a:rPr lang="en-US" sz="1600" dirty="0" smtClean="0"/>
-              <a:t> Digital </a:t>
-            </a:r>
-            <a:r>
-              <a:rPr lang="en-US" sz="1600" dirty="0" smtClean="0"/>
-              <a:t>Asset M</a:t>
-            </a:r>
-            <a:r>
-              <a:rPr lang="en-US" sz="1600" dirty="0" smtClean="0"/>
-              <a:t>anagement</a:t>
+              <a:t> Digital Asset Management</a:t>
             </a:r>
             <a:endParaRPr lang="en-US" sz="1600" dirty="0"/>
           </a:p>
@@ -8493,11 +8481,7 @@
             </a:pPr>
             <a:r>
               <a:rPr lang="en-US" sz="1600" b="1" dirty="0" smtClean="0"/>
-              <a:t>Front-end</a:t>
-            </a:r>
-            <a:r>
-              <a:rPr lang="en-US" sz="1600" b="1" dirty="0" smtClean="0"/>
-              <a:t>:</a:t>
+              <a:t>Front-end:</a:t>
             </a:r>
             <a:endParaRPr lang="en-US" sz="1600" dirty="0" smtClean="0"/>
           </a:p>
@@ -8573,17 +8557,12 @@
             </a:pPr>
             <a:r>
               <a:rPr lang="en-US" sz="1600" dirty="0" err="1" smtClean="0"/>
-              <a:t>.</a:t>
-            </a:r>
-            <a:r>
-              <a:rPr lang="en-US" sz="1600" dirty="0" err="1" smtClean="0"/>
-              <a:t>net</a:t>
+              <a:t>.net</a:t>
             </a:r>
             <a:r>
               <a:rPr lang="en-US" sz="1600" dirty="0" smtClean="0"/>
               <a:t> Core, </a:t>
             </a:r>
-            <a:endParaRPr lang="en-US" sz="1600" dirty="0" smtClean="0"/>
           </a:p>
           <a:p>
             <a:pPr marL="800100" lvl="1" indent="-342900">
@@ -8604,7 +8583,6 @@
               <a:rPr lang="en-US" sz="1600" dirty="0" smtClean="0"/>
               <a:t>Azure</a:t>
             </a:r>
-            <a:endParaRPr lang="en-US" sz="1600" dirty="0" smtClean="0"/>
           </a:p>
           <a:p>
             <a:pPr marL="342900" indent="-342900">
@@ -15007,12 +14985,9 @@
 </file>
 
 <file path=customXml/item1.xml><?xml version="1.0" encoding="utf-8"?>
-<?mso-contentType ?>
-<FormTemplates xmlns="http://schemas.microsoft.com/sharepoint/v3/contenttype/forms">
-  <Display>DocumentLibraryForm</Display>
-  <Edit>DocumentLibraryForm</Edit>
-  <New>DocumentLibraryForm</New>
-</FormTemplates>
+<p:properties xmlns:p="http://schemas.microsoft.com/office/2006/metadata/properties" xmlns:xsi="http://www.w3.org/2001/XMLSchema-instance" xmlns:pc="http://schemas.microsoft.com/office/infopath/2007/PartnerControls">
+  <documentManagement/>
+</p:properties>
 </file>
 
 <file path=customXml/item2.xml><?xml version="1.0" encoding="utf-8"?>
@@ -15188,15 +15163,19 @@
 </file>
 
 <file path=customXml/item3.xml><?xml version="1.0" encoding="utf-8"?>
-<p:properties xmlns:p="http://schemas.microsoft.com/office/2006/metadata/properties" xmlns:xsi="http://www.w3.org/2001/XMLSchema-instance" xmlns:pc="http://schemas.microsoft.com/office/infopath/2007/PartnerControls">
-  <documentManagement/>
-</p:properties>
+<?mso-contentType ?>
+<FormTemplates xmlns="http://schemas.microsoft.com/sharepoint/v3/contenttype/forms">
+  <Display>DocumentLibraryForm</Display>
+  <Edit>DocumentLibraryForm</Edit>
+  <New>DocumentLibraryForm</New>
+</FormTemplates>
 </file>
 
 <file path=customXml/itemProps1.xml><?xml version="1.0" encoding="utf-8"?>
-<ds:datastoreItem xmlns:ds="http://schemas.openxmlformats.org/officeDocument/2006/customXml" ds:itemID="{8CDB702E-3F50-4264-9CFC-35B79A02A69A}">
+<ds:datastoreItem xmlns:ds="http://schemas.openxmlformats.org/officeDocument/2006/customXml" ds:itemID="{2B86CB2E-7645-4F93-82AF-04EAF2AF8C03}">
   <ds:schemaRefs>
-    <ds:schemaRef ds:uri="http://schemas.microsoft.com/sharepoint/v3/contenttype/forms"/>
+    <ds:schemaRef ds:uri="http://schemas.microsoft.com/office/2006/metadata/properties"/>
+    <ds:schemaRef ds:uri="http://schemas.microsoft.com/office/infopath/2007/PartnerControls"/>
   </ds:schemaRefs>
 </ds:datastoreItem>
 </file>
@@ -15220,10 +15199,9 @@
 </file>
 
 <file path=customXml/itemProps3.xml><?xml version="1.0" encoding="utf-8"?>
-<ds:datastoreItem xmlns:ds="http://schemas.openxmlformats.org/officeDocument/2006/customXml" ds:itemID="{2B86CB2E-7645-4F93-82AF-04EAF2AF8C03}">
+<ds:datastoreItem xmlns:ds="http://schemas.openxmlformats.org/officeDocument/2006/customXml" ds:itemID="{8CDB702E-3F50-4264-9CFC-35B79A02A69A}">
   <ds:schemaRefs>
-    <ds:schemaRef ds:uri="http://schemas.microsoft.com/office/2006/metadata/properties"/>
-    <ds:schemaRef ds:uri="http://schemas.microsoft.com/office/infopath/2007/PartnerControls"/>
+    <ds:schemaRef ds:uri="http://schemas.microsoft.com/sharepoint/v3/contenttype/forms"/>
   </ds:schemaRefs>
 </ds:datastoreItem>
 </file>
</xml_diff>